<commit_message>
Added slide on I/O stream state
</commit_message>
<xml_diff>
--- a/CPlusPlus/08_essential_cpp_io.pptx
+++ b/CPlusPlus/08_essential_cpp_io.pptx
@@ -5,13 +5,14 @@
     <p:sldMasterId id="2147483660" r:id="rId1"/>
   </p:sldMasterIdLst>
   <p:notesMasterIdLst>
-    <p:notesMasterId r:id="rId6"/>
+    <p:notesMasterId r:id="rId7"/>
   </p:notesMasterIdLst>
   <p:sldIdLst>
     <p:sldId id="257" r:id="rId2"/>
     <p:sldId id="258" r:id="rId3"/>
     <p:sldId id="259" r:id="rId4"/>
     <p:sldId id="260" r:id="rId5"/>
+    <p:sldId id="261" r:id="rId6"/>
   </p:sldIdLst>
   <p:sldSz cx="9144000" cy="6858000" type="screen4x3"/>
   <p:notesSz cx="6858000" cy="9144000"/>
@@ -5999,6 +6000,365 @@
 </p:sld>
 </file>
 
+<file path=ppt/slides/slide5.xml><?xml version="1.0" encoding="utf-8"?>
+<p:sld xmlns:a="http://schemas.openxmlformats.org/drawingml/2006/main" xmlns:r="http://schemas.openxmlformats.org/officeDocument/2006/relationships" xmlns:p="http://schemas.openxmlformats.org/presentationml/2006/main">
+  <p:cSld>
+    <p:spTree>
+      <p:nvGrpSpPr>
+        <p:cNvPr id="1" name=""/>
+        <p:cNvGrpSpPr/>
+        <p:nvPr/>
+      </p:nvGrpSpPr>
+      <p:grpSpPr>
+        <a:xfrm>
+          <a:off x="0" y="0"/>
+          <a:ext cx="0" cy="0"/>
+          <a:chOff x="0" y="0"/>
+          <a:chExt cx="0" cy="0"/>
+        </a:xfrm>
+      </p:grpSpPr>
+      <p:sp>
+        <p:nvSpPr>
+          <p:cNvPr id="2" name="Title 1"/>
+          <p:cNvSpPr>
+            <a:spLocks noGrp="1"/>
+          </p:cNvSpPr>
+          <p:nvPr>
+            <p:ph type="title"/>
+          </p:nvPr>
+        </p:nvSpPr>
+        <p:spPr/>
+        <p:txBody>
+          <a:bodyPr/>
+          <a:lstStyle/>
+          <a:p>
+            <a:r>
+              <a:rPr lang="en-US" dirty="0" smtClean="0"/>
+              <a:t>Stream state</a:t>
+            </a:r>
+            <a:endParaRPr lang="en-US" dirty="0"/>
+          </a:p>
+        </p:txBody>
+      </p:sp>
+      <p:sp>
+        <p:nvSpPr>
+          <p:cNvPr id="3" name="Content Placeholder 2"/>
+          <p:cNvSpPr>
+            <a:spLocks noGrp="1"/>
+          </p:cNvSpPr>
+          <p:nvPr>
+            <p:ph idx="1"/>
+          </p:nvPr>
+        </p:nvSpPr>
+        <p:spPr/>
+        <p:txBody>
+          <a:bodyPr/>
+          <a:lstStyle/>
+          <a:p>
+            <a:r>
+              <a:rPr lang="en-US" dirty="0" smtClean="0"/>
+              <a:t>Result of </a:t>
+            </a:r>
+            <a:r>
+              <a:rPr lang="en-US" dirty="0" smtClean="0">
+                <a:latin typeface="Courier New" panose="02070309020205020404" pitchFamily="49" charset="0"/>
+                <a:cs typeface="Courier New" panose="02070309020205020404" pitchFamily="49" charset="0"/>
+              </a:rPr>
+              <a:t>&gt;&gt;</a:t>
+            </a:r>
+            <a:r>
+              <a:rPr lang="en-US" dirty="0" smtClean="0"/>
+              <a:t> is reference to </a:t>
+            </a:r>
+            <a:r>
+              <a:rPr lang="en-US" dirty="0" err="1" smtClean="0">
+                <a:latin typeface="Courier New" panose="02070309020205020404" pitchFamily="49" charset="0"/>
+                <a:cs typeface="Courier New" panose="02070309020205020404" pitchFamily="49" charset="0"/>
+              </a:rPr>
+              <a:t>istream</a:t>
+            </a:r>
+            <a:endParaRPr lang="en-US" dirty="0" smtClean="0">
+              <a:latin typeface="Courier New" panose="02070309020205020404" pitchFamily="49" charset="0"/>
+              <a:cs typeface="Courier New" panose="02070309020205020404" pitchFamily="49" charset="0"/>
+            </a:endParaRPr>
+          </a:p>
+          <a:p>
+            <a:r>
+              <a:rPr lang="en-US" dirty="0" smtClean="0"/>
+              <a:t>Reference to </a:t>
+            </a:r>
+            <a:r>
+              <a:rPr lang="en-US" dirty="0" err="1" smtClean="0">
+                <a:latin typeface="Courier New" panose="02070309020205020404" pitchFamily="49" charset="0"/>
+                <a:cs typeface="Courier New" panose="02070309020205020404" pitchFamily="49" charset="0"/>
+              </a:rPr>
+              <a:t>istream</a:t>
+            </a:r>
+            <a:r>
+              <a:rPr lang="en-US" dirty="0" smtClean="0"/>
+              <a:t> evaluates to </a:t>
+            </a:r>
+            <a:r>
+              <a:rPr lang="en-US" dirty="0" smtClean="0">
+                <a:latin typeface="Courier New" panose="02070309020205020404" pitchFamily="49" charset="0"/>
+                <a:cs typeface="Courier New" panose="02070309020205020404" pitchFamily="49" charset="0"/>
+              </a:rPr>
+              <a:t>true</a:t>
+            </a:r>
+            <a:r>
+              <a:rPr lang="en-US" dirty="0" smtClean="0"/>
+              <a:t> if ready for reading</a:t>
+            </a:r>
+          </a:p>
+          <a:p>
+            <a:endParaRPr lang="en-US" dirty="0"/>
+          </a:p>
+          <a:p>
+            <a:endParaRPr lang="en-US" dirty="0" smtClean="0"/>
+          </a:p>
+          <a:p>
+            <a:endParaRPr lang="en-US" dirty="0"/>
+          </a:p>
+          <a:p>
+            <a:r>
+              <a:rPr lang="en-US" dirty="0" smtClean="0"/>
+              <a:t>Explicit check end-of-file: </a:t>
+            </a:r>
+            <a:r>
+              <a:rPr lang="en-US" dirty="0" err="1" smtClean="0">
+                <a:latin typeface="Courier New" panose="02070309020205020404" pitchFamily="49" charset="0"/>
+                <a:cs typeface="Courier New" panose="02070309020205020404" pitchFamily="49" charset="0"/>
+              </a:rPr>
+              <a:t>std</a:t>
+            </a:r>
+            <a:r>
+              <a:rPr lang="en-US" dirty="0" smtClean="0">
+                <a:latin typeface="Courier New" panose="02070309020205020404" pitchFamily="49" charset="0"/>
+                <a:cs typeface="Courier New" panose="02070309020205020404" pitchFamily="49" charset="0"/>
+              </a:rPr>
+              <a:t>::</a:t>
+            </a:r>
+            <a:r>
+              <a:rPr lang="en-US" dirty="0" err="1" smtClean="0">
+                <a:latin typeface="Courier New" panose="02070309020205020404" pitchFamily="49" charset="0"/>
+                <a:cs typeface="Courier New" panose="02070309020205020404" pitchFamily="49" charset="0"/>
+              </a:rPr>
+              <a:t>cin.eof</a:t>
+            </a:r>
+            <a:r>
+              <a:rPr lang="en-US" dirty="0" smtClean="0">
+                <a:latin typeface="Courier New" panose="02070309020205020404" pitchFamily="49" charset="0"/>
+                <a:cs typeface="Courier New" panose="02070309020205020404" pitchFamily="49" charset="0"/>
+              </a:rPr>
+              <a:t>()</a:t>
+            </a:r>
+            <a:endParaRPr lang="en-US" dirty="0">
+              <a:latin typeface="Courier New" panose="02070309020205020404" pitchFamily="49" charset="0"/>
+              <a:cs typeface="Courier New" panose="02070309020205020404" pitchFamily="49" charset="0"/>
+            </a:endParaRPr>
+          </a:p>
+        </p:txBody>
+      </p:sp>
+      <p:sp>
+        <p:nvSpPr>
+          <p:cNvPr id="4" name="Slide Number Placeholder 3"/>
+          <p:cNvSpPr>
+            <a:spLocks noGrp="1"/>
+          </p:cNvSpPr>
+          <p:nvPr>
+            <p:ph type="sldNum" sz="quarter" idx="12"/>
+          </p:nvPr>
+        </p:nvSpPr>
+        <p:spPr/>
+        <p:txBody>
+          <a:bodyPr/>
+          <a:lstStyle/>
+          <a:p>
+            <a:fld id="{9CEF4966-5219-4577-B301-14467D565841}" type="slidenum">
+              <a:rPr lang="en-US" smtClean="0"/>
+              <a:t>5</a:t>
+            </a:fld>
+            <a:endParaRPr lang="en-US"/>
+          </a:p>
+        </p:txBody>
+      </p:sp>
+      <p:sp>
+        <p:nvSpPr>
+          <p:cNvPr id="5" name="TextBox 4"/>
+          <p:cNvSpPr txBox="1"/>
+          <p:nvPr/>
+        </p:nvSpPr>
+        <p:spPr>
+          <a:xfrm>
+            <a:off x="628650" y="3289115"/>
+            <a:ext cx="6961853" cy="1323439"/>
+          </a:xfrm>
+          <a:prstGeom prst="rect">
+            <a:avLst/>
+          </a:prstGeom>
+          <a:solidFill>
+            <a:schemeClr val="bg1">
+              <a:lumMod val="75000"/>
+            </a:schemeClr>
+          </a:solidFill>
+        </p:spPr>
+        <p:txBody>
+          <a:bodyPr wrap="square" rtlCol="0">
+            <a:spAutoFit/>
+          </a:bodyPr>
+          <a:lstStyle/>
+          <a:p>
+            <a:r>
+              <a:rPr lang="nn-NO" sz="1600" dirty="0" smtClean="0">
+                <a:latin typeface="Courier New" pitchFamily="49" charset="0"/>
+                <a:cs typeface="Courier New" pitchFamily="49" charset="0"/>
+              </a:rPr>
+              <a:t>double data {0.0};</a:t>
+            </a:r>
+          </a:p>
+          <a:p>
+            <a:r>
+              <a:rPr lang="nn-NO" sz="1600" dirty="0" smtClean="0">
+                <a:latin typeface="Courier New" pitchFamily="49" charset="0"/>
+                <a:cs typeface="Courier New" pitchFamily="49" charset="0"/>
+              </a:rPr>
+              <a:t>double sum {0.0};</a:t>
+            </a:r>
+          </a:p>
+          <a:p>
+            <a:r>
+              <a:rPr lang="nn-NO" sz="1600" dirty="0" smtClean="0">
+                <a:latin typeface="Courier New" pitchFamily="49" charset="0"/>
+                <a:cs typeface="Courier New" pitchFamily="49" charset="0"/>
+              </a:rPr>
+              <a:t>while (std::cin &gt;&gt; data)</a:t>
+            </a:r>
+          </a:p>
+          <a:p>
+            <a:r>
+              <a:rPr lang="nn-NO" sz="1600" dirty="0">
+                <a:latin typeface="Courier New" pitchFamily="49" charset="0"/>
+                <a:cs typeface="Courier New" pitchFamily="49" charset="0"/>
+              </a:rPr>
+              <a:t> </a:t>
+            </a:r>
+            <a:r>
+              <a:rPr lang="nn-NO" sz="1600" dirty="0" smtClean="0">
+                <a:latin typeface="Courier New" pitchFamily="49" charset="0"/>
+                <a:cs typeface="Courier New" pitchFamily="49" charset="0"/>
+              </a:rPr>
+              <a:t>   sum += data;</a:t>
+            </a:r>
+          </a:p>
+          <a:p>
+            <a:r>
+              <a:rPr lang="nn-NO" sz="1600" dirty="0" smtClean="0">
+                <a:latin typeface="Courier New" pitchFamily="49" charset="0"/>
+                <a:cs typeface="Courier New" pitchFamily="49" charset="0"/>
+              </a:rPr>
+              <a:t>std::out &lt;&lt; "sum = " &lt;&lt; sum &lt;&lt; std::endl;</a:t>
+            </a:r>
+            <a:endParaRPr lang="nn-NO" sz="1600" dirty="0">
+              <a:latin typeface="Courier New" pitchFamily="49" charset="0"/>
+              <a:cs typeface="Courier New" pitchFamily="49" charset="0"/>
+            </a:endParaRPr>
+          </a:p>
+        </p:txBody>
+      </p:sp>
+    </p:spTree>
+    <p:extLst>
+      <p:ext uri="{BB962C8B-B14F-4D97-AF65-F5344CB8AC3E}">
+        <p14:creationId xmlns:p14="http://schemas.microsoft.com/office/powerpoint/2010/main" val="4182161745"/>
+      </p:ext>
+    </p:extLst>
+  </p:cSld>
+  <p:clrMapOvr>
+    <a:masterClrMapping/>
+  </p:clrMapOvr>
+  <p:timing>
+    <p:tnLst>
+      <p:par>
+        <p:cTn id="1" dur="indefinite" restart="never" nodeType="tmRoot">
+          <p:childTnLst>
+            <p:seq concurrent="1" nextAc="seek">
+              <p:cTn id="2" dur="indefinite" nodeType="mainSeq">
+                <p:childTnLst>
+                  <p:par>
+                    <p:cTn id="3" fill="hold">
+                      <p:stCondLst>
+                        <p:cond delay="indefinite"/>
+                        <p:cond evt="onBegin" delay="0">
+                          <p:tn val="2"/>
+                        </p:cond>
+                      </p:stCondLst>
+                      <p:childTnLst>
+                        <p:par>
+                          <p:cTn id="4" fill="hold">
+                            <p:stCondLst>
+                              <p:cond delay="0"/>
+                            </p:stCondLst>
+                            <p:childTnLst>
+                              <p:par>
+                                <p:cTn id="5" presetID="1" presetClass="entr" presetSubtype="0" fill="hold" grpId="0" nodeType="withEffect">
+                                  <p:stCondLst>
+                                    <p:cond delay="0"/>
+                                  </p:stCondLst>
+                                  <p:childTnLst>
+                                    <p:set>
+                                      <p:cBhvr>
+                                        <p:cTn id="6" dur="1" fill="hold">
+                                          <p:stCondLst>
+                                            <p:cond delay="0"/>
+                                          </p:stCondLst>
+                                        </p:cTn>
+                                        <p:tgtEl>
+                                          <p:spTgt spid="5"/>
+                                        </p:tgtEl>
+                                        <p:attrNameLst>
+                                          <p:attrName>style.visibility</p:attrName>
+                                        </p:attrNameLst>
+                                      </p:cBhvr>
+                                      <p:to>
+                                        <p:strVal val="visible"/>
+                                      </p:to>
+                                    </p:set>
+                                  </p:childTnLst>
+                                </p:cTn>
+                              </p:par>
+                            </p:childTnLst>
+                          </p:cTn>
+                        </p:par>
+                      </p:childTnLst>
+                    </p:cTn>
+                  </p:par>
+                </p:childTnLst>
+              </p:cTn>
+              <p:prevCondLst>
+                <p:cond evt="onPrev" delay="0">
+                  <p:tgtEl>
+                    <p:sldTgt/>
+                  </p:tgtEl>
+                </p:cond>
+              </p:prevCondLst>
+              <p:nextCondLst>
+                <p:cond evt="onNext" delay="0">
+                  <p:tgtEl>
+                    <p:sldTgt/>
+                  </p:tgtEl>
+                </p:cond>
+              </p:nextCondLst>
+            </p:seq>
+          </p:childTnLst>
+        </p:cTn>
+      </p:par>
+    </p:tnLst>
+    <p:bldLst>
+      <p:bldP spid="5" grpId="0" animBg="1"/>
+    </p:bldLst>
+  </p:timing>
+</p:sld>
+</file>
+
 <file path=ppt/theme/theme1.xml><?xml version="1.0" encoding="utf-8"?>
 <a:theme xmlns:a="http://schemas.openxmlformats.org/drawingml/2006/main" name="Office Theme">
   <a:themeElements>

</xml_diff>

<commit_message>
Added slides on I/O formattin
</commit_message>
<xml_diff>
--- a/CPlusPlus/08_essential_cpp_io.pptx
+++ b/CPlusPlus/08_essential_cpp_io.pptx
@@ -5,7 +5,7 @@
     <p:sldMasterId id="2147483660" r:id="rId1"/>
   </p:sldMasterIdLst>
   <p:notesMasterIdLst>
-    <p:notesMasterId r:id="rId7"/>
+    <p:notesMasterId r:id="rId9"/>
   </p:notesMasterIdLst>
   <p:sldIdLst>
     <p:sldId id="257" r:id="rId2"/>
@@ -13,6 +13,8 @@
     <p:sldId id="259" r:id="rId4"/>
     <p:sldId id="260" r:id="rId5"/>
     <p:sldId id="261" r:id="rId6"/>
+    <p:sldId id="262" r:id="rId7"/>
+    <p:sldId id="263" r:id="rId8"/>
   </p:sldIdLst>
   <p:sldSz cx="9144000" cy="6858000" type="screen4x3"/>
   <p:notesSz cx="6858000" cy="9144000"/>
@@ -6489,6 +6491,1413 @@
 </p:sld>
 </file>
 
+<file path=ppt/slides/slide6.xml><?xml version="1.0" encoding="utf-8"?>
+<p:sld xmlns:a="http://schemas.openxmlformats.org/drawingml/2006/main" xmlns:r="http://schemas.openxmlformats.org/officeDocument/2006/relationships" xmlns:p="http://schemas.openxmlformats.org/presentationml/2006/main">
+  <p:cSld>
+    <p:spTree>
+      <p:nvGrpSpPr>
+        <p:cNvPr id="1" name=""/>
+        <p:cNvGrpSpPr/>
+        <p:nvPr/>
+      </p:nvGrpSpPr>
+      <p:grpSpPr>
+        <a:xfrm>
+          <a:off x="0" y="0"/>
+          <a:ext cx="0" cy="0"/>
+          <a:chOff x="0" y="0"/>
+          <a:chExt cx="0" cy="0"/>
+        </a:xfrm>
+      </p:grpSpPr>
+      <p:sp>
+        <p:nvSpPr>
+          <p:cNvPr id="2" name="Title 1"/>
+          <p:cNvSpPr>
+            <a:spLocks noGrp="1"/>
+          </p:cNvSpPr>
+          <p:nvPr>
+            <p:ph type="title"/>
+          </p:nvPr>
+        </p:nvSpPr>
+        <p:spPr/>
+        <p:txBody>
+          <a:bodyPr/>
+          <a:lstStyle/>
+          <a:p>
+            <a:r>
+              <a:rPr lang="en-US" dirty="0" smtClean="0"/>
+              <a:t>Floating point formatting</a:t>
+            </a:r>
+            <a:endParaRPr lang="en-US" dirty="0"/>
+          </a:p>
+        </p:txBody>
+      </p:sp>
+      <p:sp>
+        <p:nvSpPr>
+          <p:cNvPr id="3" name="Content Placeholder 2"/>
+          <p:cNvSpPr>
+            <a:spLocks noGrp="1"/>
+          </p:cNvSpPr>
+          <p:nvPr>
+            <p:ph idx="1"/>
+          </p:nvPr>
+        </p:nvSpPr>
+        <p:spPr/>
+        <p:txBody>
+          <a:bodyPr>
+            <a:normAutofit/>
+          </a:bodyPr>
+          <a:lstStyle/>
+          <a:p>
+            <a:r>
+              <a:rPr lang="en-US" dirty="0" smtClean="0"/>
+              <a:t>Floating point formats: </a:t>
+            </a:r>
+            <a:r>
+              <a:rPr lang="en-US" dirty="0" smtClean="0">
+                <a:latin typeface="Courier New" panose="02070309020205020404" pitchFamily="49" charset="0"/>
+                <a:cs typeface="Courier New" panose="02070309020205020404" pitchFamily="49" charset="0"/>
+              </a:rPr>
+              <a:t>scientific</a:t>
+            </a:r>
+            <a:r>
+              <a:rPr lang="en-US" dirty="0" smtClean="0"/>
+              <a:t>, </a:t>
+            </a:r>
+            <a:r>
+              <a:rPr lang="en-US" dirty="0" smtClean="0">
+                <a:latin typeface="Courier New" panose="02070309020205020404" pitchFamily="49" charset="0"/>
+                <a:cs typeface="Courier New" panose="02070309020205020404" pitchFamily="49" charset="0"/>
+              </a:rPr>
+              <a:t>fixed</a:t>
+            </a:r>
+            <a:r>
+              <a:rPr lang="en-US" dirty="0" smtClean="0"/>
+              <a:t>, </a:t>
+            </a:r>
+            <a:r>
+              <a:rPr lang="en-US" dirty="0" err="1" smtClean="0">
+                <a:latin typeface="Courier New" panose="02070309020205020404" pitchFamily="49" charset="0"/>
+                <a:cs typeface="Courier New" panose="02070309020205020404" pitchFamily="49" charset="0"/>
+              </a:rPr>
+              <a:t>defaultfloat</a:t>
+            </a:r>
+            <a:endParaRPr lang="en-US" dirty="0" smtClean="0">
+              <a:latin typeface="Courier New" panose="02070309020205020404" pitchFamily="49" charset="0"/>
+              <a:cs typeface="Courier New" panose="02070309020205020404" pitchFamily="49" charset="0"/>
+            </a:endParaRPr>
+          </a:p>
+          <a:p>
+            <a:pPr lvl="1"/>
+            <a:r>
+              <a:rPr lang="en-US" dirty="0"/>
+              <a:t>Getting/setting </a:t>
+            </a:r>
+            <a:r>
+              <a:rPr lang="en-US" dirty="0" smtClean="0"/>
+              <a:t>precision (number digits), </a:t>
+            </a:r>
+            <a:r>
+              <a:rPr lang="en-US" dirty="0"/>
+              <a:t>e.g.,</a:t>
+            </a:r>
+            <a:br>
+              <a:rPr lang="en-US" dirty="0"/>
+            </a:br>
+            <a:r>
+              <a:rPr lang="en-US" dirty="0" err="1" smtClean="0">
+                <a:latin typeface="Courier New" panose="02070309020205020404" pitchFamily="49" charset="0"/>
+                <a:cs typeface="Courier New" panose="02070309020205020404" pitchFamily="49" charset="0"/>
+              </a:rPr>
+              <a:t>cout.precision</a:t>
+            </a:r>
+            <a:r>
+              <a:rPr lang="en-US" dirty="0" smtClean="0">
+                <a:latin typeface="Courier New" panose="02070309020205020404" pitchFamily="49" charset="0"/>
+                <a:cs typeface="Courier New" panose="02070309020205020404" pitchFamily="49" charset="0"/>
+              </a:rPr>
+              <a:t>()</a:t>
+            </a:r>
+            <a:r>
+              <a:rPr lang="en-US" dirty="0" smtClean="0">
+                <a:cs typeface="Courier New" panose="02070309020205020404" pitchFamily="49" charset="0"/>
+              </a:rPr>
+              <a:t>/</a:t>
+            </a:r>
+            <a:r>
+              <a:rPr lang="en-US" dirty="0" err="1" smtClean="0">
+                <a:latin typeface="Courier New" panose="02070309020205020404" pitchFamily="49" charset="0"/>
+                <a:cs typeface="Courier New" panose="02070309020205020404" pitchFamily="49" charset="0"/>
+              </a:rPr>
+              <a:t>cout.precision</a:t>
+            </a:r>
+            <a:r>
+              <a:rPr lang="en-US" dirty="0" smtClean="0">
+                <a:latin typeface="Courier New" panose="02070309020205020404" pitchFamily="49" charset="0"/>
+                <a:cs typeface="Courier New" panose="02070309020205020404" pitchFamily="49" charset="0"/>
+              </a:rPr>
+              <a:t>(4)</a:t>
+            </a:r>
+          </a:p>
+        </p:txBody>
+      </p:sp>
+      <p:sp>
+        <p:nvSpPr>
+          <p:cNvPr id="4" name="Slide Number Placeholder 3"/>
+          <p:cNvSpPr>
+            <a:spLocks noGrp="1"/>
+          </p:cNvSpPr>
+          <p:nvPr>
+            <p:ph type="sldNum" sz="quarter" idx="12"/>
+          </p:nvPr>
+        </p:nvSpPr>
+        <p:spPr/>
+        <p:txBody>
+          <a:bodyPr/>
+          <a:lstStyle/>
+          <a:p>
+            <a:fld id="{9CEF4966-5219-4577-B301-14467D565841}" type="slidenum">
+              <a:rPr lang="en-US" smtClean="0"/>
+              <a:t>6</a:t>
+            </a:fld>
+            <a:endParaRPr lang="en-US"/>
+          </a:p>
+        </p:txBody>
+      </p:sp>
+      <p:sp>
+        <p:nvSpPr>
+          <p:cNvPr id="5" name="TextBox 4"/>
+          <p:cNvSpPr txBox="1"/>
+          <p:nvPr/>
+        </p:nvSpPr>
+        <p:spPr>
+          <a:xfrm>
+            <a:off x="923618" y="3613580"/>
+            <a:ext cx="4670937" cy="1323439"/>
+          </a:xfrm>
+          <a:prstGeom prst="rect">
+            <a:avLst/>
+          </a:prstGeom>
+          <a:solidFill>
+            <a:schemeClr val="bg1">
+              <a:lumMod val="75000"/>
+            </a:schemeClr>
+          </a:solidFill>
+        </p:spPr>
+        <p:txBody>
+          <a:bodyPr wrap="square" rtlCol="0">
+            <a:spAutoFit/>
+          </a:bodyPr>
+          <a:lstStyle/>
+          <a:p>
+            <a:r>
+              <a:rPr lang="nn-NO" sz="1600" dirty="0" smtClean="0">
+                <a:latin typeface="Courier New" pitchFamily="49" charset="0"/>
+                <a:cs typeface="Courier New" pitchFamily="49" charset="0"/>
+              </a:rPr>
+              <a:t>const double PI {acos(-1.0)};</a:t>
+            </a:r>
+          </a:p>
+          <a:p>
+            <a:r>
+              <a:rPr lang="nn-NO" sz="1600" dirty="0">
+                <a:latin typeface="Courier New" pitchFamily="49" charset="0"/>
+                <a:cs typeface="Courier New" pitchFamily="49" charset="0"/>
+              </a:rPr>
+              <a:t>cout &lt;&lt; PI &lt;&lt; endl;</a:t>
+            </a:r>
+          </a:p>
+          <a:p>
+            <a:r>
+              <a:rPr lang="nn-NO" sz="1600" dirty="0" smtClean="0">
+                <a:latin typeface="Courier New" pitchFamily="49" charset="0"/>
+                <a:cs typeface="Courier New" pitchFamily="49" charset="0"/>
+              </a:rPr>
+              <a:t>cout </a:t>
+            </a:r>
+            <a:r>
+              <a:rPr lang="nn-NO" sz="1600" dirty="0">
+                <a:latin typeface="Courier New" pitchFamily="49" charset="0"/>
+                <a:cs typeface="Courier New" pitchFamily="49" charset="0"/>
+              </a:rPr>
+              <a:t>&lt;&lt; scientific &lt;&lt; PI &lt;&lt; endl;</a:t>
+            </a:r>
+          </a:p>
+          <a:p>
+            <a:r>
+              <a:rPr lang="nn-NO" sz="1600" dirty="0">
+                <a:latin typeface="Courier New" pitchFamily="49" charset="0"/>
+                <a:cs typeface="Courier New" pitchFamily="49" charset="0"/>
+              </a:rPr>
+              <a:t>cout.precision(4);</a:t>
+            </a:r>
+          </a:p>
+          <a:p>
+            <a:r>
+              <a:rPr lang="nn-NO" sz="1600" dirty="0" smtClean="0">
+                <a:latin typeface="Courier New" pitchFamily="49" charset="0"/>
+                <a:cs typeface="Courier New" pitchFamily="49" charset="0"/>
+              </a:rPr>
+              <a:t>cout </a:t>
+            </a:r>
+            <a:r>
+              <a:rPr lang="nn-NO" sz="1600" dirty="0">
+                <a:latin typeface="Courier New" pitchFamily="49" charset="0"/>
+                <a:cs typeface="Courier New" pitchFamily="49" charset="0"/>
+              </a:rPr>
+              <a:t>&lt;&lt; </a:t>
+            </a:r>
+            <a:r>
+              <a:rPr lang="nn-NO" sz="1600" dirty="0" smtClean="0">
+                <a:latin typeface="Courier New" pitchFamily="49" charset="0"/>
+                <a:cs typeface="Courier New" pitchFamily="49" charset="0"/>
+              </a:rPr>
+              <a:t>defaultfloat &lt;&lt; </a:t>
+            </a:r>
+            <a:r>
+              <a:rPr lang="nn-NO" sz="1600" dirty="0">
+                <a:latin typeface="Courier New" pitchFamily="49" charset="0"/>
+                <a:cs typeface="Courier New" pitchFamily="49" charset="0"/>
+              </a:rPr>
+              <a:t>PI &lt;&lt; endl</a:t>
+            </a:r>
+            <a:r>
+              <a:rPr lang="nn-NO" sz="1600" dirty="0" smtClean="0">
+                <a:latin typeface="Courier New" pitchFamily="49" charset="0"/>
+                <a:cs typeface="Courier New" pitchFamily="49" charset="0"/>
+              </a:rPr>
+              <a:t>;</a:t>
+            </a:r>
+            <a:endParaRPr lang="nn-NO" sz="1600" dirty="0">
+              <a:latin typeface="Courier New" pitchFamily="49" charset="0"/>
+              <a:cs typeface="Courier New" pitchFamily="49" charset="0"/>
+            </a:endParaRPr>
+          </a:p>
+        </p:txBody>
+      </p:sp>
+      <p:sp>
+        <p:nvSpPr>
+          <p:cNvPr id="6" name="TextBox 5"/>
+          <p:cNvSpPr txBox="1"/>
+          <p:nvPr/>
+        </p:nvSpPr>
+        <p:spPr>
+          <a:xfrm>
+            <a:off x="6513677" y="3613580"/>
+            <a:ext cx="1529586" cy="369332"/>
+          </a:xfrm>
+          <a:prstGeom prst="rect">
+            <a:avLst/>
+          </a:prstGeom>
+          <a:solidFill>
+            <a:schemeClr val="tx1"/>
+          </a:solidFill>
+        </p:spPr>
+        <p:txBody>
+          <a:bodyPr wrap="square" rtlCol="0">
+            <a:spAutoFit/>
+          </a:bodyPr>
+          <a:lstStyle/>
+          <a:p>
+            <a:r>
+              <a:rPr lang="en-US" b="1" dirty="0" smtClean="0">
+                <a:solidFill>
+                  <a:schemeClr val="bg1"/>
+                </a:solidFill>
+              </a:rPr>
+              <a:t>3.14159</a:t>
+            </a:r>
+            <a:endParaRPr lang="en-US" b="1" dirty="0">
+              <a:solidFill>
+                <a:schemeClr val="bg1"/>
+              </a:solidFill>
+            </a:endParaRPr>
+          </a:p>
+        </p:txBody>
+      </p:sp>
+      <p:sp>
+        <p:nvSpPr>
+          <p:cNvPr id="7" name="TextBox 6"/>
+          <p:cNvSpPr txBox="1"/>
+          <p:nvPr/>
+        </p:nvSpPr>
+        <p:spPr>
+          <a:xfrm>
+            <a:off x="6513677" y="4090633"/>
+            <a:ext cx="1529586" cy="369332"/>
+          </a:xfrm>
+          <a:prstGeom prst="rect">
+            <a:avLst/>
+          </a:prstGeom>
+          <a:solidFill>
+            <a:schemeClr val="tx1"/>
+          </a:solidFill>
+        </p:spPr>
+        <p:txBody>
+          <a:bodyPr wrap="none" rtlCol="0">
+            <a:spAutoFit/>
+          </a:bodyPr>
+          <a:lstStyle/>
+          <a:p>
+            <a:r>
+              <a:rPr lang="en-US" b="1" dirty="0" smtClean="0">
+                <a:solidFill>
+                  <a:schemeClr val="bg1"/>
+                </a:solidFill>
+              </a:rPr>
+              <a:t>3.141593e+00</a:t>
+            </a:r>
+            <a:endParaRPr lang="en-US" b="1" dirty="0">
+              <a:solidFill>
+                <a:schemeClr val="bg1"/>
+              </a:solidFill>
+            </a:endParaRPr>
+          </a:p>
+        </p:txBody>
+      </p:sp>
+      <p:sp>
+        <p:nvSpPr>
+          <p:cNvPr id="8" name="TextBox 7"/>
+          <p:cNvSpPr txBox="1"/>
+          <p:nvPr/>
+        </p:nvSpPr>
+        <p:spPr>
+          <a:xfrm>
+            <a:off x="6513677" y="4574805"/>
+            <a:ext cx="1529586" cy="369332"/>
+          </a:xfrm>
+          <a:prstGeom prst="rect">
+            <a:avLst/>
+          </a:prstGeom>
+          <a:solidFill>
+            <a:schemeClr val="tx1"/>
+          </a:solidFill>
+        </p:spPr>
+        <p:txBody>
+          <a:bodyPr wrap="square" rtlCol="0">
+            <a:spAutoFit/>
+          </a:bodyPr>
+          <a:lstStyle/>
+          <a:p>
+            <a:r>
+              <a:rPr lang="en-US" b="1" dirty="0" smtClean="0">
+                <a:solidFill>
+                  <a:schemeClr val="bg1"/>
+                </a:solidFill>
+              </a:rPr>
+              <a:t>3.142</a:t>
+            </a:r>
+            <a:endParaRPr lang="en-US" b="1" dirty="0">
+              <a:solidFill>
+                <a:schemeClr val="bg1"/>
+              </a:solidFill>
+            </a:endParaRPr>
+          </a:p>
+        </p:txBody>
+      </p:sp>
+    </p:spTree>
+    <p:extLst>
+      <p:ext uri="{BB962C8B-B14F-4D97-AF65-F5344CB8AC3E}">
+        <p14:creationId xmlns:p14="http://schemas.microsoft.com/office/powerpoint/2010/main" val="3920554824"/>
+      </p:ext>
+    </p:extLst>
+  </p:cSld>
+  <p:clrMapOvr>
+    <a:masterClrMapping/>
+  </p:clrMapOvr>
+  <p:timing>
+    <p:tnLst>
+      <p:par>
+        <p:cTn id="1" dur="indefinite" restart="never" nodeType="tmRoot">
+          <p:childTnLst>
+            <p:seq concurrent="1" nextAc="seek">
+              <p:cTn id="2" dur="indefinite" nodeType="mainSeq">
+                <p:childTnLst>
+                  <p:par>
+                    <p:cTn id="3" fill="hold">
+                      <p:stCondLst>
+                        <p:cond delay="indefinite"/>
+                      </p:stCondLst>
+                      <p:childTnLst>
+                        <p:par>
+                          <p:cTn id="4" fill="hold">
+                            <p:stCondLst>
+                              <p:cond delay="0"/>
+                            </p:stCondLst>
+                            <p:childTnLst>
+                              <p:par>
+                                <p:cTn id="5" presetID="1" presetClass="entr" presetSubtype="0" fill="hold" grpId="0" nodeType="clickEffect">
+                                  <p:stCondLst>
+                                    <p:cond delay="0"/>
+                                  </p:stCondLst>
+                                  <p:childTnLst>
+                                    <p:set>
+                                      <p:cBhvr>
+                                        <p:cTn id="6" dur="1" fill="hold">
+                                          <p:stCondLst>
+                                            <p:cond delay="0"/>
+                                          </p:stCondLst>
+                                        </p:cTn>
+                                        <p:tgtEl>
+                                          <p:spTgt spid="3">
+                                            <p:txEl>
+                                              <p:pRg st="0" end="0"/>
+                                            </p:txEl>
+                                          </p:spTgt>
+                                        </p:tgtEl>
+                                        <p:attrNameLst>
+                                          <p:attrName>style.visibility</p:attrName>
+                                        </p:attrNameLst>
+                                      </p:cBhvr>
+                                      <p:to>
+                                        <p:strVal val="visible"/>
+                                      </p:to>
+                                    </p:set>
+                                  </p:childTnLst>
+                                </p:cTn>
+                              </p:par>
+                              <p:par>
+                                <p:cTn id="7" presetID="1" presetClass="entr" presetSubtype="0" fill="hold" grpId="0" nodeType="withEffect">
+                                  <p:stCondLst>
+                                    <p:cond delay="0"/>
+                                  </p:stCondLst>
+                                  <p:childTnLst>
+                                    <p:set>
+                                      <p:cBhvr>
+                                        <p:cTn id="8" dur="1" fill="hold">
+                                          <p:stCondLst>
+                                            <p:cond delay="0"/>
+                                          </p:stCondLst>
+                                        </p:cTn>
+                                        <p:tgtEl>
+                                          <p:spTgt spid="3">
+                                            <p:txEl>
+                                              <p:pRg st="1" end="1"/>
+                                            </p:txEl>
+                                          </p:spTgt>
+                                        </p:tgtEl>
+                                        <p:attrNameLst>
+                                          <p:attrName>style.visibility</p:attrName>
+                                        </p:attrNameLst>
+                                      </p:cBhvr>
+                                      <p:to>
+                                        <p:strVal val="visible"/>
+                                      </p:to>
+                                    </p:set>
+                                  </p:childTnLst>
+                                </p:cTn>
+                              </p:par>
+                            </p:childTnLst>
+                          </p:cTn>
+                        </p:par>
+                      </p:childTnLst>
+                    </p:cTn>
+                  </p:par>
+                  <p:par>
+                    <p:cTn id="9" fill="hold">
+                      <p:stCondLst>
+                        <p:cond delay="indefinite"/>
+                      </p:stCondLst>
+                      <p:childTnLst>
+                        <p:par>
+                          <p:cTn id="10" fill="hold">
+                            <p:stCondLst>
+                              <p:cond delay="0"/>
+                            </p:stCondLst>
+                            <p:childTnLst>
+                              <p:par>
+                                <p:cTn id="11" presetID="1" presetClass="entr" presetSubtype="0" fill="hold" grpId="0" nodeType="clickEffect">
+                                  <p:stCondLst>
+                                    <p:cond delay="0"/>
+                                  </p:stCondLst>
+                                  <p:childTnLst>
+                                    <p:set>
+                                      <p:cBhvr>
+                                        <p:cTn id="12" dur="1" fill="hold">
+                                          <p:stCondLst>
+                                            <p:cond delay="0"/>
+                                          </p:stCondLst>
+                                        </p:cTn>
+                                        <p:tgtEl>
+                                          <p:spTgt spid="5"/>
+                                        </p:tgtEl>
+                                        <p:attrNameLst>
+                                          <p:attrName>style.visibility</p:attrName>
+                                        </p:attrNameLst>
+                                      </p:cBhvr>
+                                      <p:to>
+                                        <p:strVal val="visible"/>
+                                      </p:to>
+                                    </p:set>
+                                  </p:childTnLst>
+                                </p:cTn>
+                              </p:par>
+                            </p:childTnLst>
+                          </p:cTn>
+                        </p:par>
+                      </p:childTnLst>
+                    </p:cTn>
+                  </p:par>
+                  <p:par>
+                    <p:cTn id="13" fill="hold">
+                      <p:stCondLst>
+                        <p:cond delay="indefinite"/>
+                      </p:stCondLst>
+                      <p:childTnLst>
+                        <p:par>
+                          <p:cTn id="14" fill="hold">
+                            <p:stCondLst>
+                              <p:cond delay="0"/>
+                            </p:stCondLst>
+                            <p:childTnLst>
+                              <p:par>
+                                <p:cTn id="15" presetID="1" presetClass="entr" presetSubtype="0" fill="hold" grpId="0" nodeType="clickEffect">
+                                  <p:stCondLst>
+                                    <p:cond delay="0"/>
+                                  </p:stCondLst>
+                                  <p:childTnLst>
+                                    <p:set>
+                                      <p:cBhvr>
+                                        <p:cTn id="16" dur="1" fill="hold">
+                                          <p:stCondLst>
+                                            <p:cond delay="0"/>
+                                          </p:stCondLst>
+                                        </p:cTn>
+                                        <p:tgtEl>
+                                          <p:spTgt spid="6"/>
+                                        </p:tgtEl>
+                                        <p:attrNameLst>
+                                          <p:attrName>style.visibility</p:attrName>
+                                        </p:attrNameLst>
+                                      </p:cBhvr>
+                                      <p:to>
+                                        <p:strVal val="visible"/>
+                                      </p:to>
+                                    </p:set>
+                                  </p:childTnLst>
+                                </p:cTn>
+                              </p:par>
+                            </p:childTnLst>
+                          </p:cTn>
+                        </p:par>
+                      </p:childTnLst>
+                    </p:cTn>
+                  </p:par>
+                  <p:par>
+                    <p:cTn id="17" fill="hold">
+                      <p:stCondLst>
+                        <p:cond delay="indefinite"/>
+                      </p:stCondLst>
+                      <p:childTnLst>
+                        <p:par>
+                          <p:cTn id="18" fill="hold">
+                            <p:stCondLst>
+                              <p:cond delay="0"/>
+                            </p:stCondLst>
+                            <p:childTnLst>
+                              <p:par>
+                                <p:cTn id="19" presetID="1" presetClass="entr" presetSubtype="0" fill="hold" grpId="0" nodeType="clickEffect">
+                                  <p:stCondLst>
+                                    <p:cond delay="0"/>
+                                  </p:stCondLst>
+                                  <p:childTnLst>
+                                    <p:set>
+                                      <p:cBhvr>
+                                        <p:cTn id="20" dur="1" fill="hold">
+                                          <p:stCondLst>
+                                            <p:cond delay="0"/>
+                                          </p:stCondLst>
+                                        </p:cTn>
+                                        <p:tgtEl>
+                                          <p:spTgt spid="7"/>
+                                        </p:tgtEl>
+                                        <p:attrNameLst>
+                                          <p:attrName>style.visibility</p:attrName>
+                                        </p:attrNameLst>
+                                      </p:cBhvr>
+                                      <p:to>
+                                        <p:strVal val="visible"/>
+                                      </p:to>
+                                    </p:set>
+                                  </p:childTnLst>
+                                </p:cTn>
+                              </p:par>
+                            </p:childTnLst>
+                          </p:cTn>
+                        </p:par>
+                      </p:childTnLst>
+                    </p:cTn>
+                  </p:par>
+                  <p:par>
+                    <p:cTn id="21" fill="hold">
+                      <p:stCondLst>
+                        <p:cond delay="indefinite"/>
+                      </p:stCondLst>
+                      <p:childTnLst>
+                        <p:par>
+                          <p:cTn id="22" fill="hold">
+                            <p:stCondLst>
+                              <p:cond delay="0"/>
+                            </p:stCondLst>
+                            <p:childTnLst>
+                              <p:par>
+                                <p:cTn id="23" presetID="1" presetClass="entr" presetSubtype="0" fill="hold" grpId="0" nodeType="clickEffect">
+                                  <p:stCondLst>
+                                    <p:cond delay="0"/>
+                                  </p:stCondLst>
+                                  <p:childTnLst>
+                                    <p:set>
+                                      <p:cBhvr>
+                                        <p:cTn id="24" dur="1" fill="hold">
+                                          <p:stCondLst>
+                                            <p:cond delay="0"/>
+                                          </p:stCondLst>
+                                        </p:cTn>
+                                        <p:tgtEl>
+                                          <p:spTgt spid="8"/>
+                                        </p:tgtEl>
+                                        <p:attrNameLst>
+                                          <p:attrName>style.visibility</p:attrName>
+                                        </p:attrNameLst>
+                                      </p:cBhvr>
+                                      <p:to>
+                                        <p:strVal val="visible"/>
+                                      </p:to>
+                                    </p:set>
+                                  </p:childTnLst>
+                                </p:cTn>
+                              </p:par>
+                            </p:childTnLst>
+                          </p:cTn>
+                        </p:par>
+                      </p:childTnLst>
+                    </p:cTn>
+                  </p:par>
+                </p:childTnLst>
+              </p:cTn>
+              <p:prevCondLst>
+                <p:cond evt="onPrev" delay="0">
+                  <p:tgtEl>
+                    <p:sldTgt/>
+                  </p:tgtEl>
+                </p:cond>
+              </p:prevCondLst>
+              <p:nextCondLst>
+                <p:cond evt="onNext" delay="0">
+                  <p:tgtEl>
+                    <p:sldTgt/>
+                  </p:tgtEl>
+                </p:cond>
+              </p:nextCondLst>
+            </p:seq>
+          </p:childTnLst>
+        </p:cTn>
+      </p:par>
+    </p:tnLst>
+    <p:bldLst>
+      <p:bldP spid="3" grpId="0" uiExpand="1" build="p"/>
+      <p:bldP spid="5" grpId="0" animBg="1"/>
+      <p:bldP spid="6" grpId="0" animBg="1"/>
+      <p:bldP spid="7" grpId="0" animBg="1"/>
+      <p:bldP spid="8" grpId="0" animBg="1"/>
+    </p:bldLst>
+  </p:timing>
+</p:sld>
+</file>
+
+<file path=ppt/slides/slide7.xml><?xml version="1.0" encoding="utf-8"?>
+<p:sld xmlns:a="http://schemas.openxmlformats.org/drawingml/2006/main" xmlns:r="http://schemas.openxmlformats.org/officeDocument/2006/relationships" xmlns:p="http://schemas.openxmlformats.org/presentationml/2006/main">
+  <p:cSld>
+    <p:spTree>
+      <p:nvGrpSpPr>
+        <p:cNvPr id="1" name=""/>
+        <p:cNvGrpSpPr/>
+        <p:nvPr/>
+      </p:nvGrpSpPr>
+      <p:grpSpPr>
+        <a:xfrm>
+          <a:off x="0" y="0"/>
+          <a:ext cx="0" cy="0"/>
+          <a:chOff x="0" y="0"/>
+          <a:chExt cx="0" cy="0"/>
+        </a:xfrm>
+      </p:grpSpPr>
+      <p:sp>
+        <p:nvSpPr>
+          <p:cNvPr id="2" name="Title 1"/>
+          <p:cNvSpPr>
+            <a:spLocks noGrp="1"/>
+          </p:cNvSpPr>
+          <p:nvPr>
+            <p:ph type="title"/>
+          </p:nvPr>
+        </p:nvSpPr>
+        <p:spPr/>
+        <p:txBody>
+          <a:bodyPr/>
+          <a:lstStyle/>
+          <a:p>
+            <a:r>
+              <a:rPr lang="en-US" dirty="0" smtClean="0"/>
+              <a:t>Formatting: width and fill</a:t>
+            </a:r>
+            <a:endParaRPr lang="en-US" dirty="0"/>
+          </a:p>
+        </p:txBody>
+      </p:sp>
+      <p:sp>
+        <p:nvSpPr>
+          <p:cNvPr id="3" name="Content Placeholder 2"/>
+          <p:cNvSpPr>
+            <a:spLocks noGrp="1"/>
+          </p:cNvSpPr>
+          <p:nvPr>
+            <p:ph idx="1"/>
+          </p:nvPr>
+        </p:nvSpPr>
+        <p:spPr/>
+        <p:txBody>
+          <a:bodyPr/>
+          <a:lstStyle/>
+          <a:p>
+            <a:r>
+              <a:rPr lang="en-US" dirty="0"/>
+              <a:t>Getting/setting width, e.g.,</a:t>
+            </a:r>
+            <a:br>
+              <a:rPr lang="en-US" dirty="0"/>
+            </a:br>
+            <a:r>
+              <a:rPr lang="en-US" dirty="0" err="1">
+                <a:latin typeface="Courier New" panose="02070309020205020404" pitchFamily="49" charset="0"/>
+                <a:cs typeface="Courier New" panose="02070309020205020404" pitchFamily="49" charset="0"/>
+              </a:rPr>
+              <a:t>cout.width</a:t>
+            </a:r>
+            <a:r>
+              <a:rPr lang="en-US" dirty="0">
+                <a:latin typeface="Courier New" panose="02070309020205020404" pitchFamily="49" charset="0"/>
+                <a:cs typeface="Courier New" panose="02070309020205020404" pitchFamily="49" charset="0"/>
+              </a:rPr>
+              <a:t>()</a:t>
+            </a:r>
+            <a:r>
+              <a:rPr lang="en-US" dirty="0"/>
+              <a:t>/</a:t>
+            </a:r>
+            <a:r>
+              <a:rPr lang="en-US" dirty="0" err="1">
+                <a:latin typeface="Courier New" panose="02070309020205020404" pitchFamily="49" charset="0"/>
+                <a:cs typeface="Courier New" panose="02070309020205020404" pitchFamily="49" charset="0"/>
+              </a:rPr>
+              <a:t>cout.width</a:t>
+            </a:r>
+            <a:r>
+              <a:rPr lang="en-US" dirty="0">
+                <a:latin typeface="Courier New" panose="02070309020205020404" pitchFamily="49" charset="0"/>
+                <a:cs typeface="Courier New" panose="02070309020205020404" pitchFamily="49" charset="0"/>
+              </a:rPr>
+              <a:t>(5)</a:t>
+            </a:r>
+          </a:p>
+          <a:p>
+            <a:r>
+              <a:rPr lang="en-US" dirty="0"/>
+              <a:t>Getting/setting fill character, e.g.,</a:t>
+            </a:r>
+            <a:br>
+              <a:rPr lang="en-US" dirty="0"/>
+            </a:br>
+            <a:r>
+              <a:rPr lang="en-US" dirty="0" err="1">
+                <a:latin typeface="Courier New" panose="02070309020205020404" pitchFamily="49" charset="0"/>
+                <a:cs typeface="Courier New" panose="02070309020205020404" pitchFamily="49" charset="0"/>
+              </a:rPr>
+              <a:t>cout.fill</a:t>
+            </a:r>
+            <a:r>
+              <a:rPr lang="en-US" dirty="0">
+                <a:latin typeface="Courier New" panose="02070309020205020404" pitchFamily="49" charset="0"/>
+                <a:cs typeface="Courier New" panose="02070309020205020404" pitchFamily="49" charset="0"/>
+              </a:rPr>
+              <a:t>()</a:t>
+            </a:r>
+            <a:r>
+              <a:rPr lang="en-US" dirty="0"/>
+              <a:t>/</a:t>
+            </a:r>
+            <a:r>
+              <a:rPr lang="en-US" dirty="0" err="1">
+                <a:latin typeface="Courier New" panose="02070309020205020404" pitchFamily="49" charset="0"/>
+                <a:cs typeface="Courier New" panose="02070309020205020404" pitchFamily="49" charset="0"/>
+              </a:rPr>
+              <a:t>cout.fill</a:t>
+            </a:r>
+            <a:r>
+              <a:rPr lang="en-US" dirty="0">
+                <a:latin typeface="Courier New" panose="02070309020205020404" pitchFamily="49" charset="0"/>
+                <a:cs typeface="Courier New" panose="02070309020205020404" pitchFamily="49" charset="0"/>
+              </a:rPr>
+              <a:t>('0')</a:t>
+            </a:r>
+          </a:p>
+          <a:p>
+            <a:endParaRPr lang="en-US" dirty="0"/>
+          </a:p>
+        </p:txBody>
+      </p:sp>
+      <p:sp>
+        <p:nvSpPr>
+          <p:cNvPr id="4" name="Slide Number Placeholder 3"/>
+          <p:cNvSpPr>
+            <a:spLocks noGrp="1"/>
+          </p:cNvSpPr>
+          <p:nvPr>
+            <p:ph type="sldNum" sz="quarter" idx="12"/>
+          </p:nvPr>
+        </p:nvSpPr>
+        <p:spPr/>
+        <p:txBody>
+          <a:bodyPr/>
+          <a:lstStyle/>
+          <a:p>
+            <a:fld id="{9CEF4966-5219-4577-B301-14467D565841}" type="slidenum">
+              <a:rPr lang="en-US" smtClean="0"/>
+              <a:t>7</a:t>
+            </a:fld>
+            <a:endParaRPr lang="en-US"/>
+          </a:p>
+        </p:txBody>
+      </p:sp>
+      <p:sp>
+        <p:nvSpPr>
+          <p:cNvPr id="5" name="TextBox 4"/>
+          <p:cNvSpPr txBox="1"/>
+          <p:nvPr/>
+        </p:nvSpPr>
+        <p:spPr>
+          <a:xfrm>
+            <a:off x="923618" y="3884884"/>
+            <a:ext cx="4670937" cy="2308324"/>
+          </a:xfrm>
+          <a:prstGeom prst="rect">
+            <a:avLst/>
+          </a:prstGeom>
+          <a:solidFill>
+            <a:schemeClr val="bg1">
+              <a:lumMod val="75000"/>
+            </a:schemeClr>
+          </a:solidFill>
+        </p:spPr>
+        <p:txBody>
+          <a:bodyPr wrap="square" rtlCol="0">
+            <a:spAutoFit/>
+          </a:bodyPr>
+          <a:lstStyle/>
+          <a:p>
+            <a:r>
+              <a:rPr lang="nn-NO" sz="1600" dirty="0" smtClean="0">
+                <a:latin typeface="Courier New" pitchFamily="49" charset="0"/>
+                <a:cs typeface="Courier New" pitchFamily="49" charset="0"/>
+              </a:rPr>
+              <a:t>const int data {123};</a:t>
+            </a:r>
+          </a:p>
+          <a:p>
+            <a:r>
+              <a:rPr lang="nn-NO" sz="1600" dirty="0">
+                <a:latin typeface="Courier New" pitchFamily="49" charset="0"/>
+                <a:cs typeface="Courier New" pitchFamily="49" charset="0"/>
+              </a:rPr>
+              <a:t>cout &lt;&lt; </a:t>
+            </a:r>
+            <a:r>
+              <a:rPr lang="nn-NO" sz="1600" dirty="0" smtClean="0">
+                <a:latin typeface="Courier New" pitchFamily="49" charset="0"/>
+                <a:cs typeface="Courier New" pitchFamily="49" charset="0"/>
+              </a:rPr>
+              <a:t>data &lt;&lt; </a:t>
+            </a:r>
+            <a:r>
+              <a:rPr lang="nn-NO" sz="1600" dirty="0">
+                <a:latin typeface="Courier New" pitchFamily="49" charset="0"/>
+                <a:cs typeface="Courier New" pitchFamily="49" charset="0"/>
+              </a:rPr>
+              <a:t>endl</a:t>
+            </a:r>
+            <a:r>
+              <a:rPr lang="nn-NO" sz="1600" dirty="0" smtClean="0">
+                <a:latin typeface="Courier New" pitchFamily="49" charset="0"/>
+                <a:cs typeface="Courier New" pitchFamily="49" charset="0"/>
+              </a:rPr>
+              <a:t>;</a:t>
+            </a:r>
+          </a:p>
+          <a:p>
+            <a:r>
+              <a:rPr lang="nn-NO" sz="1600" dirty="0" smtClean="0">
+                <a:latin typeface="Courier New" pitchFamily="49" charset="0"/>
+                <a:cs typeface="Courier New" pitchFamily="49" charset="0"/>
+              </a:rPr>
+              <a:t>auto orig_width = cout.width();</a:t>
+            </a:r>
+          </a:p>
+          <a:p>
+            <a:r>
+              <a:rPr lang="nn-NO" sz="1600" dirty="0" smtClean="0">
+                <a:latin typeface="Courier New" pitchFamily="49" charset="0"/>
+                <a:cs typeface="Courier New" pitchFamily="49" charset="0"/>
+              </a:rPr>
+              <a:t>cout.width(5);</a:t>
+            </a:r>
+          </a:p>
+          <a:p>
+            <a:r>
+              <a:rPr lang="nn-NO" sz="1600" dirty="0" smtClean="0">
+                <a:latin typeface="Courier New" pitchFamily="49" charset="0"/>
+                <a:cs typeface="Courier New" pitchFamily="49" charset="0"/>
+              </a:rPr>
+              <a:t>auto orig_fill = cout.fill();</a:t>
+            </a:r>
+          </a:p>
+          <a:p>
+            <a:r>
+              <a:rPr lang="nn-NO" sz="1600" dirty="0" smtClean="0">
+                <a:latin typeface="Courier New" pitchFamily="49" charset="0"/>
+                <a:cs typeface="Courier New" pitchFamily="49" charset="0"/>
+              </a:rPr>
+              <a:t>cout.fill('0');</a:t>
+            </a:r>
+            <a:endParaRPr lang="nn-NO" sz="1600" dirty="0">
+              <a:latin typeface="Courier New" pitchFamily="49" charset="0"/>
+              <a:cs typeface="Courier New" pitchFamily="49" charset="0"/>
+            </a:endParaRPr>
+          </a:p>
+          <a:p>
+            <a:r>
+              <a:rPr lang="nn-NO" sz="1600" dirty="0" smtClean="0">
+                <a:latin typeface="Courier New" pitchFamily="49" charset="0"/>
+                <a:cs typeface="Courier New" pitchFamily="49" charset="0"/>
+              </a:rPr>
+              <a:t>cout </a:t>
+            </a:r>
+            <a:r>
+              <a:rPr lang="nn-NO" sz="1600" dirty="0">
+                <a:latin typeface="Courier New" pitchFamily="49" charset="0"/>
+                <a:cs typeface="Courier New" pitchFamily="49" charset="0"/>
+              </a:rPr>
+              <a:t>&lt;&lt; </a:t>
+            </a:r>
+            <a:r>
+              <a:rPr lang="nn-NO" sz="1600" dirty="0" smtClean="0">
+                <a:latin typeface="Courier New" pitchFamily="49" charset="0"/>
+                <a:cs typeface="Courier New" pitchFamily="49" charset="0"/>
+              </a:rPr>
+              <a:t>data </a:t>
+            </a:r>
+            <a:r>
+              <a:rPr lang="nn-NO" sz="1600" dirty="0">
+                <a:latin typeface="Courier New" pitchFamily="49" charset="0"/>
+                <a:cs typeface="Courier New" pitchFamily="49" charset="0"/>
+              </a:rPr>
+              <a:t>&lt;&lt; endl</a:t>
+            </a:r>
+            <a:r>
+              <a:rPr lang="nn-NO" sz="1600" dirty="0" smtClean="0">
+                <a:latin typeface="Courier New" pitchFamily="49" charset="0"/>
+                <a:cs typeface="Courier New" pitchFamily="49" charset="0"/>
+              </a:rPr>
+              <a:t>;</a:t>
+            </a:r>
+          </a:p>
+          <a:p>
+            <a:r>
+              <a:rPr lang="nn-NO" sz="1600" dirty="0" smtClean="0">
+                <a:latin typeface="Courier New" pitchFamily="49" charset="0"/>
+                <a:cs typeface="Courier New" pitchFamily="49" charset="0"/>
+              </a:rPr>
+              <a:t>cout.width(orig_width);</a:t>
+            </a:r>
+          </a:p>
+          <a:p>
+            <a:r>
+              <a:rPr lang="nn-NO" sz="1600" dirty="0" smtClean="0">
+                <a:latin typeface="Courier New" pitchFamily="49" charset="0"/>
+                <a:cs typeface="Courier New" pitchFamily="49" charset="0"/>
+              </a:rPr>
+              <a:t>cout.fill(orig_fill);</a:t>
+            </a:r>
+            <a:endParaRPr lang="nn-NO" sz="1600" dirty="0">
+              <a:latin typeface="Courier New" pitchFamily="49" charset="0"/>
+              <a:cs typeface="Courier New" pitchFamily="49" charset="0"/>
+            </a:endParaRPr>
+          </a:p>
+        </p:txBody>
+      </p:sp>
+      <p:sp>
+        <p:nvSpPr>
+          <p:cNvPr id="6" name="TextBox 5"/>
+          <p:cNvSpPr txBox="1"/>
+          <p:nvPr/>
+        </p:nvSpPr>
+        <p:spPr>
+          <a:xfrm>
+            <a:off x="6081598" y="4081678"/>
+            <a:ext cx="811571" cy="369332"/>
+          </a:xfrm>
+          <a:prstGeom prst="rect">
+            <a:avLst/>
+          </a:prstGeom>
+          <a:solidFill>
+            <a:schemeClr val="tx1"/>
+          </a:solidFill>
+        </p:spPr>
+        <p:txBody>
+          <a:bodyPr wrap="square" rtlCol="0">
+            <a:spAutoFit/>
+          </a:bodyPr>
+          <a:lstStyle/>
+          <a:p>
+            <a:r>
+              <a:rPr lang="en-US" b="1" dirty="0" smtClean="0">
+                <a:solidFill>
+                  <a:schemeClr val="bg1"/>
+                </a:solidFill>
+              </a:rPr>
+              <a:t>123</a:t>
+            </a:r>
+            <a:endParaRPr lang="en-US" b="1" dirty="0">
+              <a:solidFill>
+                <a:schemeClr val="bg1"/>
+              </a:solidFill>
+            </a:endParaRPr>
+          </a:p>
+        </p:txBody>
+      </p:sp>
+      <p:sp>
+        <p:nvSpPr>
+          <p:cNvPr id="7" name="TextBox 6"/>
+          <p:cNvSpPr txBox="1"/>
+          <p:nvPr/>
+        </p:nvSpPr>
+        <p:spPr>
+          <a:xfrm>
+            <a:off x="6081598" y="5369541"/>
+            <a:ext cx="811571" cy="369332"/>
+          </a:xfrm>
+          <a:prstGeom prst="rect">
+            <a:avLst/>
+          </a:prstGeom>
+          <a:solidFill>
+            <a:schemeClr val="tx1"/>
+          </a:solidFill>
+        </p:spPr>
+        <p:txBody>
+          <a:bodyPr wrap="square" rtlCol="0">
+            <a:spAutoFit/>
+          </a:bodyPr>
+          <a:lstStyle/>
+          <a:p>
+            <a:r>
+              <a:rPr lang="en-US" b="1" dirty="0" smtClean="0">
+                <a:solidFill>
+                  <a:schemeClr val="bg1"/>
+                </a:solidFill>
+              </a:rPr>
+              <a:t>00123</a:t>
+            </a:r>
+            <a:endParaRPr lang="en-US" b="1" dirty="0">
+              <a:solidFill>
+                <a:schemeClr val="bg1"/>
+              </a:solidFill>
+            </a:endParaRPr>
+          </a:p>
+        </p:txBody>
+      </p:sp>
+    </p:spTree>
+    <p:extLst>
+      <p:ext uri="{BB962C8B-B14F-4D97-AF65-F5344CB8AC3E}">
+        <p14:creationId xmlns:p14="http://schemas.microsoft.com/office/powerpoint/2010/main" val="3329870627"/>
+      </p:ext>
+    </p:extLst>
+  </p:cSld>
+  <p:clrMapOvr>
+    <a:masterClrMapping/>
+  </p:clrMapOvr>
+  <p:timing>
+    <p:tnLst>
+      <p:par>
+        <p:cTn id="1" dur="indefinite" restart="never" nodeType="tmRoot">
+          <p:childTnLst>
+            <p:seq concurrent="1" nextAc="seek">
+              <p:cTn id="2" dur="indefinite" nodeType="mainSeq">
+                <p:childTnLst>
+                  <p:par>
+                    <p:cTn id="3" fill="hold">
+                      <p:stCondLst>
+                        <p:cond delay="indefinite"/>
+                        <p:cond evt="onBegin" delay="0">
+                          <p:tn val="2"/>
+                        </p:cond>
+                      </p:stCondLst>
+                      <p:childTnLst>
+                        <p:par>
+                          <p:cTn id="4" fill="hold">
+                            <p:stCondLst>
+                              <p:cond delay="0"/>
+                            </p:stCondLst>
+                            <p:childTnLst>
+                              <p:par>
+                                <p:cTn id="5" presetID="1" presetClass="entr" presetSubtype="0" fill="hold" grpId="0" nodeType="withEffect">
+                                  <p:stCondLst>
+                                    <p:cond delay="0"/>
+                                  </p:stCondLst>
+                                  <p:childTnLst>
+                                    <p:set>
+                                      <p:cBhvr>
+                                        <p:cTn id="6" dur="1" fill="hold">
+                                          <p:stCondLst>
+                                            <p:cond delay="0"/>
+                                          </p:stCondLst>
+                                        </p:cTn>
+                                        <p:tgtEl>
+                                          <p:spTgt spid="3">
+                                            <p:txEl>
+                                              <p:pRg st="0" end="0"/>
+                                            </p:txEl>
+                                          </p:spTgt>
+                                        </p:tgtEl>
+                                        <p:attrNameLst>
+                                          <p:attrName>style.visibility</p:attrName>
+                                        </p:attrNameLst>
+                                      </p:cBhvr>
+                                      <p:to>
+                                        <p:strVal val="visible"/>
+                                      </p:to>
+                                    </p:set>
+                                  </p:childTnLst>
+                                </p:cTn>
+                              </p:par>
+                            </p:childTnLst>
+                          </p:cTn>
+                        </p:par>
+                      </p:childTnLst>
+                    </p:cTn>
+                  </p:par>
+                  <p:par>
+                    <p:cTn id="7" fill="hold">
+                      <p:stCondLst>
+                        <p:cond delay="indefinite"/>
+                      </p:stCondLst>
+                      <p:childTnLst>
+                        <p:par>
+                          <p:cTn id="8" fill="hold">
+                            <p:stCondLst>
+                              <p:cond delay="0"/>
+                            </p:stCondLst>
+                            <p:childTnLst>
+                              <p:par>
+                                <p:cTn id="9" presetID="1" presetClass="entr" presetSubtype="0" fill="hold" grpId="0" nodeType="clickEffect">
+                                  <p:stCondLst>
+                                    <p:cond delay="0"/>
+                                  </p:stCondLst>
+                                  <p:childTnLst>
+                                    <p:set>
+                                      <p:cBhvr>
+                                        <p:cTn id="10" dur="1" fill="hold">
+                                          <p:stCondLst>
+                                            <p:cond delay="0"/>
+                                          </p:stCondLst>
+                                        </p:cTn>
+                                        <p:tgtEl>
+                                          <p:spTgt spid="3">
+                                            <p:txEl>
+                                              <p:pRg st="1" end="1"/>
+                                            </p:txEl>
+                                          </p:spTgt>
+                                        </p:tgtEl>
+                                        <p:attrNameLst>
+                                          <p:attrName>style.visibility</p:attrName>
+                                        </p:attrNameLst>
+                                      </p:cBhvr>
+                                      <p:to>
+                                        <p:strVal val="visible"/>
+                                      </p:to>
+                                    </p:set>
+                                  </p:childTnLst>
+                                </p:cTn>
+                              </p:par>
+                            </p:childTnLst>
+                          </p:cTn>
+                        </p:par>
+                      </p:childTnLst>
+                    </p:cTn>
+                  </p:par>
+                  <p:par>
+                    <p:cTn id="11" fill="hold">
+                      <p:stCondLst>
+                        <p:cond delay="indefinite"/>
+                      </p:stCondLst>
+                      <p:childTnLst>
+                        <p:par>
+                          <p:cTn id="12" fill="hold">
+                            <p:stCondLst>
+                              <p:cond delay="0"/>
+                            </p:stCondLst>
+                            <p:childTnLst>
+                              <p:par>
+                                <p:cTn id="13" presetID="1" presetClass="entr" presetSubtype="0" fill="hold" grpId="0" nodeType="clickEffect">
+                                  <p:stCondLst>
+                                    <p:cond delay="0"/>
+                                  </p:stCondLst>
+                                  <p:childTnLst>
+                                    <p:set>
+                                      <p:cBhvr>
+                                        <p:cTn id="14" dur="1" fill="hold">
+                                          <p:stCondLst>
+                                            <p:cond delay="0"/>
+                                          </p:stCondLst>
+                                        </p:cTn>
+                                        <p:tgtEl>
+                                          <p:spTgt spid="5"/>
+                                        </p:tgtEl>
+                                        <p:attrNameLst>
+                                          <p:attrName>style.visibility</p:attrName>
+                                        </p:attrNameLst>
+                                      </p:cBhvr>
+                                      <p:to>
+                                        <p:strVal val="visible"/>
+                                      </p:to>
+                                    </p:set>
+                                  </p:childTnLst>
+                                </p:cTn>
+                              </p:par>
+                            </p:childTnLst>
+                          </p:cTn>
+                        </p:par>
+                      </p:childTnLst>
+                    </p:cTn>
+                  </p:par>
+                  <p:par>
+                    <p:cTn id="15" fill="hold">
+                      <p:stCondLst>
+                        <p:cond delay="indefinite"/>
+                      </p:stCondLst>
+                      <p:childTnLst>
+                        <p:par>
+                          <p:cTn id="16" fill="hold">
+                            <p:stCondLst>
+                              <p:cond delay="0"/>
+                            </p:stCondLst>
+                            <p:childTnLst>
+                              <p:par>
+                                <p:cTn id="17" presetID="1" presetClass="entr" presetSubtype="0" fill="hold" grpId="0" nodeType="clickEffect">
+                                  <p:stCondLst>
+                                    <p:cond delay="0"/>
+                                  </p:stCondLst>
+                                  <p:childTnLst>
+                                    <p:set>
+                                      <p:cBhvr>
+                                        <p:cTn id="18" dur="1" fill="hold">
+                                          <p:stCondLst>
+                                            <p:cond delay="0"/>
+                                          </p:stCondLst>
+                                        </p:cTn>
+                                        <p:tgtEl>
+                                          <p:spTgt spid="6"/>
+                                        </p:tgtEl>
+                                        <p:attrNameLst>
+                                          <p:attrName>style.visibility</p:attrName>
+                                        </p:attrNameLst>
+                                      </p:cBhvr>
+                                      <p:to>
+                                        <p:strVal val="visible"/>
+                                      </p:to>
+                                    </p:set>
+                                  </p:childTnLst>
+                                </p:cTn>
+                              </p:par>
+                            </p:childTnLst>
+                          </p:cTn>
+                        </p:par>
+                      </p:childTnLst>
+                    </p:cTn>
+                  </p:par>
+                  <p:par>
+                    <p:cTn id="19" fill="hold">
+                      <p:stCondLst>
+                        <p:cond delay="indefinite"/>
+                      </p:stCondLst>
+                      <p:childTnLst>
+                        <p:par>
+                          <p:cTn id="20" fill="hold">
+                            <p:stCondLst>
+                              <p:cond delay="0"/>
+                            </p:stCondLst>
+                            <p:childTnLst>
+                              <p:par>
+                                <p:cTn id="21" presetID="1" presetClass="entr" presetSubtype="0" fill="hold" grpId="0" nodeType="clickEffect">
+                                  <p:stCondLst>
+                                    <p:cond delay="0"/>
+                                  </p:stCondLst>
+                                  <p:childTnLst>
+                                    <p:set>
+                                      <p:cBhvr>
+                                        <p:cTn id="22" dur="1" fill="hold">
+                                          <p:stCondLst>
+                                            <p:cond delay="0"/>
+                                          </p:stCondLst>
+                                        </p:cTn>
+                                        <p:tgtEl>
+                                          <p:spTgt spid="7"/>
+                                        </p:tgtEl>
+                                        <p:attrNameLst>
+                                          <p:attrName>style.visibility</p:attrName>
+                                        </p:attrNameLst>
+                                      </p:cBhvr>
+                                      <p:to>
+                                        <p:strVal val="visible"/>
+                                      </p:to>
+                                    </p:set>
+                                  </p:childTnLst>
+                                </p:cTn>
+                              </p:par>
+                            </p:childTnLst>
+                          </p:cTn>
+                        </p:par>
+                      </p:childTnLst>
+                    </p:cTn>
+                  </p:par>
+                </p:childTnLst>
+              </p:cTn>
+              <p:prevCondLst>
+                <p:cond evt="onPrev" delay="0">
+                  <p:tgtEl>
+                    <p:sldTgt/>
+                  </p:tgtEl>
+                </p:cond>
+              </p:prevCondLst>
+              <p:nextCondLst>
+                <p:cond evt="onNext" delay="0">
+                  <p:tgtEl>
+                    <p:sldTgt/>
+                  </p:tgtEl>
+                </p:cond>
+              </p:nextCondLst>
+            </p:seq>
+          </p:childTnLst>
+        </p:cTn>
+      </p:par>
+    </p:tnLst>
+    <p:bldLst>
+      <p:bldP spid="3" grpId="0" uiExpand="1" build="p"/>
+      <p:bldP spid="5" grpId="0" animBg="1"/>
+      <p:bldP spid="6" grpId="0" animBg="1"/>
+      <p:bldP spid="7" grpId="0" animBg="1"/>
+    </p:bldLst>
+  </p:timing>
+</p:sld>
+</file>
+
 <file path=ppt/theme/theme1.xml><?xml version="1.0" encoding="utf-8"?>
 <a:theme xmlns:a="http://schemas.openxmlformats.org/drawingml/2006/main" name="Office Theme">
   <a:themeElements>

</xml_diff>

<commit_message>
Added file I/O slide
</commit_message>
<xml_diff>
--- a/CPlusPlus/08_essential_cpp_io.pptx
+++ b/CPlusPlus/08_essential_cpp_io.pptx
@@ -5,7 +5,7 @@
     <p:sldMasterId id="2147483660" r:id="rId1"/>
   </p:sldMasterIdLst>
   <p:notesMasterIdLst>
-    <p:notesMasterId r:id="rId9"/>
+    <p:notesMasterId r:id="rId11"/>
   </p:notesMasterIdLst>
   <p:sldIdLst>
     <p:sldId id="257" r:id="rId2"/>
@@ -15,6 +15,8 @@
     <p:sldId id="261" r:id="rId6"/>
     <p:sldId id="262" r:id="rId7"/>
     <p:sldId id="263" r:id="rId8"/>
+    <p:sldId id="264" r:id="rId9"/>
+    <p:sldId id="265" r:id="rId10"/>
   </p:sldIdLst>
   <p:sldSz cx="9144000" cy="6858000" type="screen4x3"/>
   <p:notesSz cx="6858000" cy="9144000"/>
@@ -203,7 +205,7 @@
           <a:p>
             <a:fld id="{79B8B1BA-E8A9-48CD-886E-2AED8C4BE354}" type="datetimeFigureOut">
               <a:rPr lang="en-US" smtClean="0"/>
-              <a:t>2017-03-20</a:t>
+              <a:t>2017-03-21</a:t>
             </a:fld>
             <a:endParaRPr lang="en-US"/>
           </a:p>
@@ -602,7 +604,7 @@
           <a:p>
             <a:fld id="{ABE0EDF4-4C0E-4772-84AE-1357C6001391}" type="datetime1">
               <a:rPr lang="en-US" smtClean="0"/>
-              <a:t>2017-03-20</a:t>
+              <a:t>2017-03-21</a:t>
             </a:fld>
             <a:endParaRPr lang="en-US"/>
           </a:p>
@@ -772,7 +774,7 @@
           <a:p>
             <a:fld id="{88C05809-344B-440B-9F88-C5B18C79382B}" type="datetime1">
               <a:rPr lang="en-US" smtClean="0"/>
-              <a:t>2017-03-20</a:t>
+              <a:t>2017-03-21</a:t>
             </a:fld>
             <a:endParaRPr lang="en-US"/>
           </a:p>
@@ -952,7 +954,7 @@
           <a:p>
             <a:fld id="{90F74260-95EE-4CD2-908E-53F4ED138E6A}" type="datetime1">
               <a:rPr lang="en-US" smtClean="0"/>
-              <a:t>2017-03-20</a:t>
+              <a:t>2017-03-21</a:t>
             </a:fld>
             <a:endParaRPr lang="en-US"/>
           </a:p>
@@ -1122,7 +1124,7 @@
           <a:p>
             <a:fld id="{1E3FA7D4-BD38-43A8-9130-CCA4F61A0EF1}" type="datetime1">
               <a:rPr lang="en-US" smtClean="0"/>
-              <a:t>2017-03-20</a:t>
+              <a:t>2017-03-21</a:t>
             </a:fld>
             <a:endParaRPr lang="en-US"/>
           </a:p>
@@ -1366,7 +1368,7 @@
           <a:p>
             <a:fld id="{096F3732-D81D-4EEE-A6C0-1A86B50EC6E7}" type="datetime1">
               <a:rPr lang="en-US" smtClean="0"/>
-              <a:t>2017-03-20</a:t>
+              <a:t>2017-03-21</a:t>
             </a:fld>
             <a:endParaRPr lang="en-US"/>
           </a:p>
@@ -1598,7 +1600,7 @@
           <a:p>
             <a:fld id="{08790459-F51D-4E85-A354-E358228D776E}" type="datetime1">
               <a:rPr lang="en-US" smtClean="0"/>
-              <a:t>2017-03-20</a:t>
+              <a:t>2017-03-21</a:t>
             </a:fld>
             <a:endParaRPr lang="en-US"/>
           </a:p>
@@ -1965,7 +1967,7 @@
           <a:p>
             <a:fld id="{B95FD88B-5497-4442-BF08-DF52AECDDAFE}" type="datetime1">
               <a:rPr lang="en-US" smtClean="0"/>
-              <a:t>2017-03-20</a:t>
+              <a:t>2017-03-21</a:t>
             </a:fld>
             <a:endParaRPr lang="en-US"/>
           </a:p>
@@ -2083,7 +2085,7 @@
           <a:p>
             <a:fld id="{CF2C86E3-CF93-475C-AE85-C652B2D2F9B5}" type="datetime1">
               <a:rPr lang="en-US" smtClean="0"/>
-              <a:t>2017-03-20</a:t>
+              <a:t>2017-03-21</a:t>
             </a:fld>
             <a:endParaRPr lang="en-US"/>
           </a:p>
@@ -2178,7 +2180,7 @@
           <a:p>
             <a:fld id="{F7F6E503-4705-4A51-BD29-968EA406E3C8}" type="datetime1">
               <a:rPr lang="en-US" smtClean="0"/>
-              <a:t>2017-03-20</a:t>
+              <a:t>2017-03-21</a:t>
             </a:fld>
             <a:endParaRPr lang="en-US"/>
           </a:p>
@@ -2455,7 +2457,7 @@
           <a:p>
             <a:fld id="{AF0FBBBB-E740-40DF-A365-D9B13EA44EB5}" type="datetime1">
               <a:rPr lang="en-US" smtClean="0"/>
-              <a:t>2017-03-20</a:t>
+              <a:t>2017-03-21</a:t>
             </a:fld>
             <a:endParaRPr lang="en-US"/>
           </a:p>
@@ -2712,7 +2714,7 @@
           <a:p>
             <a:fld id="{72BE145B-3D39-424D-9562-97A98B9610A2}" type="datetime1">
               <a:rPr lang="en-US" smtClean="0"/>
-              <a:t>2017-03-20</a:t>
+              <a:t>2017-03-21</a:t>
             </a:fld>
             <a:endParaRPr lang="en-US"/>
           </a:p>
@@ -2925,7 +2927,7 @@
           <a:p>
             <a:fld id="{623F5BA7-E58A-4B83-91F8-3B23CADD8CED}" type="datetime1">
               <a:rPr lang="en-US" smtClean="0"/>
-              <a:t>2017-03-20</a:t>
+              <a:t>2017-03-21</a:t>
             </a:fld>
             <a:endParaRPr lang="en-US"/>
           </a:p>
@@ -7898,6 +7900,693 @@
 </p:sld>
 </file>
 
+<file path=ppt/slides/slide8.xml><?xml version="1.0" encoding="utf-8"?>
+<p:sld xmlns:a="http://schemas.openxmlformats.org/drawingml/2006/main" xmlns:r="http://schemas.openxmlformats.org/officeDocument/2006/relationships" xmlns:p="http://schemas.openxmlformats.org/presentationml/2006/main">
+  <p:cSld>
+    <p:spTree>
+      <p:nvGrpSpPr>
+        <p:cNvPr id="1" name=""/>
+        <p:cNvGrpSpPr/>
+        <p:nvPr/>
+      </p:nvGrpSpPr>
+      <p:grpSpPr>
+        <a:xfrm>
+          <a:off x="0" y="0"/>
+          <a:ext cx="0" cy="0"/>
+          <a:chOff x="0" y="0"/>
+          <a:chExt cx="0" cy="0"/>
+        </a:xfrm>
+      </p:grpSpPr>
+      <p:sp>
+        <p:nvSpPr>
+          <p:cNvPr id="2" name="Title 1"/>
+          <p:cNvSpPr>
+            <a:spLocks noGrp="1"/>
+          </p:cNvSpPr>
+          <p:nvPr>
+            <p:ph type="title"/>
+          </p:nvPr>
+        </p:nvSpPr>
+        <p:spPr/>
+        <p:txBody>
+          <a:bodyPr/>
+          <a:lstStyle/>
+          <a:p>
+            <a:r>
+              <a:rPr lang="en-US" dirty="0" smtClean="0"/>
+              <a:t>File streams</a:t>
+            </a:r>
+            <a:endParaRPr lang="en-US" dirty="0"/>
+          </a:p>
+        </p:txBody>
+      </p:sp>
+      <p:sp>
+        <p:nvSpPr>
+          <p:cNvPr id="3" name="Content Placeholder 2"/>
+          <p:cNvSpPr>
+            <a:spLocks noGrp="1"/>
+          </p:cNvSpPr>
+          <p:nvPr>
+            <p:ph idx="1"/>
+          </p:nvPr>
+        </p:nvSpPr>
+        <p:spPr/>
+        <p:txBody>
+          <a:bodyPr/>
+          <a:lstStyle/>
+          <a:p>
+            <a:r>
+              <a:rPr lang="en-US" dirty="0" smtClean="0"/>
+              <a:t>Input file stream </a:t>
+            </a:r>
+            <a:r>
+              <a:rPr lang="en-US" dirty="0" err="1" smtClean="0">
+                <a:latin typeface="Courier New" panose="02070309020205020404" pitchFamily="49" charset="0"/>
+                <a:cs typeface="Courier New" panose="02070309020205020404" pitchFamily="49" charset="0"/>
+              </a:rPr>
+              <a:t>ifstream</a:t>
+            </a:r>
+            <a:endParaRPr lang="en-US" dirty="0">
+              <a:latin typeface="Courier New" panose="02070309020205020404" pitchFamily="49" charset="0"/>
+              <a:cs typeface="Courier New" panose="02070309020205020404" pitchFamily="49" charset="0"/>
+            </a:endParaRPr>
+          </a:p>
+          <a:p>
+            <a:endParaRPr lang="en-US" dirty="0" smtClean="0"/>
+          </a:p>
+          <a:p>
+            <a:endParaRPr lang="en-US" dirty="0"/>
+          </a:p>
+          <a:p>
+            <a:endParaRPr lang="en-US" dirty="0" smtClean="0"/>
+          </a:p>
+          <a:p>
+            <a:endParaRPr lang="en-US" dirty="0" smtClean="0"/>
+          </a:p>
+          <a:p>
+            <a:r>
+              <a:rPr lang="en-US" dirty="0" smtClean="0"/>
+              <a:t>Output file stream </a:t>
+            </a:r>
+            <a:r>
+              <a:rPr lang="en-US" dirty="0" err="1" smtClean="0">
+                <a:latin typeface="Courier New" panose="02070309020205020404" pitchFamily="49" charset="0"/>
+                <a:cs typeface="Courier New" panose="02070309020205020404" pitchFamily="49" charset="0"/>
+              </a:rPr>
+              <a:t>ofstream</a:t>
+            </a:r>
+            <a:endParaRPr lang="en-US" dirty="0">
+              <a:latin typeface="Courier New" panose="02070309020205020404" pitchFamily="49" charset="0"/>
+              <a:cs typeface="Courier New" panose="02070309020205020404" pitchFamily="49" charset="0"/>
+            </a:endParaRPr>
+          </a:p>
+        </p:txBody>
+      </p:sp>
+      <p:sp>
+        <p:nvSpPr>
+          <p:cNvPr id="4" name="Slide Number Placeholder 3"/>
+          <p:cNvSpPr>
+            <a:spLocks noGrp="1"/>
+          </p:cNvSpPr>
+          <p:nvPr>
+            <p:ph type="sldNum" sz="quarter" idx="12"/>
+          </p:nvPr>
+        </p:nvSpPr>
+        <p:spPr/>
+        <p:txBody>
+          <a:bodyPr/>
+          <a:lstStyle/>
+          <a:p>
+            <a:fld id="{9CEF4966-5219-4577-B301-14467D565841}" type="slidenum">
+              <a:rPr lang="en-US" smtClean="0"/>
+              <a:t>8</a:t>
+            </a:fld>
+            <a:endParaRPr lang="en-US"/>
+          </a:p>
+        </p:txBody>
+      </p:sp>
+      <p:sp>
+        <p:nvSpPr>
+          <p:cNvPr id="5" name="TextBox 4"/>
+          <p:cNvSpPr txBox="1"/>
+          <p:nvPr/>
+        </p:nvSpPr>
+        <p:spPr>
+          <a:xfrm>
+            <a:off x="923618" y="2301890"/>
+            <a:ext cx="4670937" cy="1846659"/>
+          </a:xfrm>
+          <a:prstGeom prst="rect">
+            <a:avLst/>
+          </a:prstGeom>
+          <a:solidFill>
+            <a:schemeClr val="bg1">
+              <a:lumMod val="75000"/>
+            </a:schemeClr>
+          </a:solidFill>
+        </p:spPr>
+        <p:txBody>
+          <a:bodyPr wrap="square" rtlCol="0">
+            <a:spAutoFit/>
+          </a:bodyPr>
+          <a:lstStyle/>
+          <a:p>
+            <a:r>
+              <a:rPr lang="nn-NO" sz="1600" dirty="0" smtClean="0">
+                <a:latin typeface="Courier New" pitchFamily="49" charset="0"/>
+                <a:cs typeface="Courier New" pitchFamily="49" charset="0"/>
+              </a:rPr>
+              <a:t>#include &lt;fstream&gt;</a:t>
+            </a:r>
+          </a:p>
+          <a:p>
+            <a:r>
+              <a:rPr lang="en-US" sz="1600" dirty="0">
+                <a:latin typeface="Courier New" panose="02070309020205020404" pitchFamily="49" charset="0"/>
+                <a:cs typeface="Courier New" panose="02070309020205020404" pitchFamily="49" charset="0"/>
+              </a:rPr>
+              <a:t>…</a:t>
+            </a:r>
+            <a:endParaRPr lang="nn-NO" sz="1600" dirty="0">
+              <a:latin typeface="Courier New" pitchFamily="49" charset="0"/>
+              <a:cs typeface="Courier New" pitchFamily="49" charset="0"/>
+            </a:endParaRPr>
+          </a:p>
+          <a:p>
+            <a:r>
+              <a:rPr lang="nn-NO" sz="1600" dirty="0" smtClean="0">
+                <a:latin typeface="Courier New" pitchFamily="49" charset="0"/>
+                <a:cs typeface="Courier New" pitchFamily="49" charset="0"/>
+              </a:rPr>
+              <a:t>ifstream ifs("data.txt");</a:t>
+            </a:r>
+          </a:p>
+          <a:p>
+            <a:r>
+              <a:rPr lang="nn-NO" sz="1600" dirty="0" smtClean="0">
+                <a:latin typeface="Courier New" pitchFamily="49" charset="0"/>
+                <a:cs typeface="Courier New" pitchFamily="49" charset="0"/>
+              </a:rPr>
+              <a:t>if (!ifs)</a:t>
+            </a:r>
+          </a:p>
+          <a:p>
+            <a:r>
+              <a:rPr lang="nn-NO" sz="1600" dirty="0">
+                <a:latin typeface="Courier New" pitchFamily="49" charset="0"/>
+                <a:cs typeface="Courier New" pitchFamily="49" charset="0"/>
+              </a:rPr>
+              <a:t> </a:t>
+            </a:r>
+            <a:r>
+              <a:rPr lang="nn-NO" sz="1600" dirty="0" smtClean="0">
+                <a:latin typeface="Courier New" pitchFamily="49" charset="0"/>
+                <a:cs typeface="Courier New" pitchFamily="49" charset="0"/>
+              </a:rPr>
+              <a:t>   /* file could not be opened */</a:t>
+            </a:r>
+            <a:endParaRPr lang="nn-NO" sz="1600" dirty="0" smtClean="0">
+              <a:latin typeface="Courier New" pitchFamily="49" charset="0"/>
+              <a:cs typeface="Courier New" pitchFamily="49" charset="0"/>
+            </a:endParaRPr>
+          </a:p>
+          <a:p>
+            <a:r>
+              <a:rPr lang="nn-NO" sz="1600" dirty="0" smtClean="0">
+                <a:latin typeface="Courier New" pitchFamily="49" charset="0"/>
+                <a:cs typeface="Courier New" pitchFamily="49" charset="0"/>
+              </a:rPr>
+              <a:t>double data {0.0};</a:t>
+            </a:r>
+          </a:p>
+          <a:p>
+            <a:r>
+              <a:rPr lang="nn-NO" sz="1600" dirty="0" smtClean="0">
+                <a:latin typeface="Courier New" pitchFamily="49" charset="0"/>
+                <a:cs typeface="Courier New" pitchFamily="49" charset="0"/>
+              </a:rPr>
+              <a:t>ifs &gt;&gt; data;</a:t>
+            </a:r>
+            <a:endParaRPr lang="nn-NO" sz="1600" dirty="0">
+              <a:latin typeface="Courier New" pitchFamily="49" charset="0"/>
+              <a:cs typeface="Courier New" pitchFamily="49" charset="0"/>
+            </a:endParaRPr>
+          </a:p>
+        </p:txBody>
+      </p:sp>
+      <p:sp>
+        <p:nvSpPr>
+          <p:cNvPr id="6" name="TextBox 5"/>
+          <p:cNvSpPr txBox="1"/>
+          <p:nvPr/>
+        </p:nvSpPr>
+        <p:spPr>
+          <a:xfrm>
+            <a:off x="923617" y="4837531"/>
+            <a:ext cx="4670937" cy="1846659"/>
+          </a:xfrm>
+          <a:prstGeom prst="rect">
+            <a:avLst/>
+          </a:prstGeom>
+          <a:solidFill>
+            <a:schemeClr val="bg1">
+              <a:lumMod val="75000"/>
+            </a:schemeClr>
+          </a:solidFill>
+        </p:spPr>
+        <p:txBody>
+          <a:bodyPr wrap="square" rtlCol="0">
+            <a:spAutoFit/>
+          </a:bodyPr>
+          <a:lstStyle/>
+          <a:p>
+            <a:r>
+              <a:rPr lang="nn-NO" sz="1600" dirty="0" smtClean="0">
+                <a:latin typeface="Courier New" pitchFamily="49" charset="0"/>
+                <a:cs typeface="Courier New" pitchFamily="49" charset="0"/>
+              </a:rPr>
+              <a:t>#include &lt;fstream&gt;</a:t>
+            </a:r>
+          </a:p>
+          <a:p>
+            <a:r>
+              <a:rPr lang="en-US" sz="1600" dirty="0">
+                <a:latin typeface="Courier New" panose="02070309020205020404" pitchFamily="49" charset="0"/>
+                <a:cs typeface="Courier New" panose="02070309020205020404" pitchFamily="49" charset="0"/>
+              </a:rPr>
+              <a:t>…</a:t>
+            </a:r>
+            <a:endParaRPr lang="nn-NO" sz="1600" dirty="0">
+              <a:latin typeface="Courier New" pitchFamily="49" charset="0"/>
+              <a:cs typeface="Courier New" pitchFamily="49" charset="0"/>
+            </a:endParaRPr>
+          </a:p>
+          <a:p>
+            <a:r>
+              <a:rPr lang="nn-NO" sz="1600" dirty="0" smtClean="0">
+                <a:latin typeface="Courier New" pitchFamily="49" charset="0"/>
+                <a:cs typeface="Courier New" pitchFamily="49" charset="0"/>
+              </a:rPr>
+              <a:t>ifstream ifs("data.txt");</a:t>
+            </a:r>
+          </a:p>
+          <a:p>
+            <a:r>
+              <a:rPr lang="nn-NO" sz="1600" dirty="0" smtClean="0">
+                <a:latin typeface="Courier New" pitchFamily="49" charset="0"/>
+                <a:cs typeface="Courier New" pitchFamily="49" charset="0"/>
+              </a:rPr>
+              <a:t>if (!ifs)</a:t>
+            </a:r>
+          </a:p>
+          <a:p>
+            <a:r>
+              <a:rPr lang="nn-NO" sz="1600" dirty="0">
+                <a:latin typeface="Courier New" pitchFamily="49" charset="0"/>
+                <a:cs typeface="Courier New" pitchFamily="49" charset="0"/>
+              </a:rPr>
+              <a:t> </a:t>
+            </a:r>
+            <a:r>
+              <a:rPr lang="nn-NO" sz="1600" dirty="0" smtClean="0">
+                <a:latin typeface="Courier New" pitchFamily="49" charset="0"/>
+                <a:cs typeface="Courier New" pitchFamily="49" charset="0"/>
+              </a:rPr>
+              <a:t>   /* file could not be opened */</a:t>
+            </a:r>
+          </a:p>
+          <a:p>
+            <a:r>
+              <a:rPr lang="nn-NO" sz="1600" dirty="0" smtClean="0">
+                <a:latin typeface="Courier New" pitchFamily="49" charset="0"/>
+                <a:cs typeface="Courier New" pitchFamily="49" charset="0"/>
+              </a:rPr>
+              <a:t>double data = </a:t>
+            </a:r>
+            <a:r>
+              <a:rPr lang="en-US" sz="1600" dirty="0">
+                <a:latin typeface="Courier New" panose="02070309020205020404" pitchFamily="49" charset="0"/>
+                <a:cs typeface="Courier New" panose="02070309020205020404" pitchFamily="49" charset="0"/>
+              </a:rPr>
+              <a:t>…</a:t>
+            </a:r>
+            <a:r>
+              <a:rPr lang="nn-NO" sz="1600" dirty="0" smtClean="0">
+                <a:latin typeface="Courier New" pitchFamily="49" charset="0"/>
+                <a:cs typeface="Courier New" pitchFamily="49" charset="0"/>
+              </a:rPr>
+              <a:t>;</a:t>
+            </a:r>
+          </a:p>
+          <a:p>
+            <a:r>
+              <a:rPr lang="nn-NO" sz="1600" dirty="0" smtClean="0">
+                <a:latin typeface="Courier New" pitchFamily="49" charset="0"/>
+                <a:cs typeface="Courier New" pitchFamily="49" charset="0"/>
+              </a:rPr>
+              <a:t>ofs &lt;&lt; data;</a:t>
+            </a:r>
+            <a:endParaRPr lang="nn-NO" sz="1600" dirty="0">
+              <a:latin typeface="Courier New" pitchFamily="49" charset="0"/>
+              <a:cs typeface="Courier New" pitchFamily="49" charset="0"/>
+            </a:endParaRPr>
+          </a:p>
+        </p:txBody>
+      </p:sp>
+    </p:spTree>
+    <p:extLst>
+      <p:ext uri="{BB962C8B-B14F-4D97-AF65-F5344CB8AC3E}">
+        <p14:creationId xmlns:p14="http://schemas.microsoft.com/office/powerpoint/2010/main" val="1434772807"/>
+      </p:ext>
+    </p:extLst>
+  </p:cSld>
+  <p:clrMapOvr>
+    <a:masterClrMapping/>
+  </p:clrMapOvr>
+  <p:timing>
+    <p:tnLst>
+      <p:par>
+        <p:cTn id="1" dur="indefinite" restart="never" nodeType="tmRoot">
+          <p:childTnLst>
+            <p:seq concurrent="1" nextAc="seek">
+              <p:cTn id="2" dur="indefinite" nodeType="mainSeq">
+                <p:childTnLst>
+                  <p:par>
+                    <p:cTn id="3" fill="hold">
+                      <p:stCondLst>
+                        <p:cond delay="indefinite"/>
+                        <p:cond evt="onBegin" delay="0">
+                          <p:tn val="2"/>
+                        </p:cond>
+                      </p:stCondLst>
+                      <p:childTnLst>
+                        <p:par>
+                          <p:cTn id="4" fill="hold">
+                            <p:stCondLst>
+                              <p:cond delay="0"/>
+                            </p:stCondLst>
+                            <p:childTnLst>
+                              <p:par>
+                                <p:cTn id="5" presetID="1" presetClass="entr" presetSubtype="0" fill="hold" grpId="0" nodeType="withEffect">
+                                  <p:stCondLst>
+                                    <p:cond delay="0"/>
+                                  </p:stCondLst>
+                                  <p:childTnLst>
+                                    <p:set>
+                                      <p:cBhvr>
+                                        <p:cTn id="6" dur="1" fill="hold">
+                                          <p:stCondLst>
+                                            <p:cond delay="0"/>
+                                          </p:stCondLst>
+                                        </p:cTn>
+                                        <p:tgtEl>
+                                          <p:spTgt spid="5"/>
+                                        </p:tgtEl>
+                                        <p:attrNameLst>
+                                          <p:attrName>style.visibility</p:attrName>
+                                        </p:attrNameLst>
+                                      </p:cBhvr>
+                                      <p:to>
+                                        <p:strVal val="visible"/>
+                                      </p:to>
+                                    </p:set>
+                                  </p:childTnLst>
+                                </p:cTn>
+                              </p:par>
+                            </p:childTnLst>
+                          </p:cTn>
+                        </p:par>
+                      </p:childTnLst>
+                    </p:cTn>
+                  </p:par>
+                  <p:par>
+                    <p:cTn id="7" fill="hold">
+                      <p:stCondLst>
+                        <p:cond delay="indefinite"/>
+                      </p:stCondLst>
+                      <p:childTnLst>
+                        <p:par>
+                          <p:cTn id="8" fill="hold">
+                            <p:stCondLst>
+                              <p:cond delay="0"/>
+                            </p:stCondLst>
+                            <p:childTnLst>
+                              <p:par>
+                                <p:cTn id="9" presetID="1" presetClass="entr" presetSubtype="0" fill="hold" grpId="0" nodeType="clickEffect">
+                                  <p:stCondLst>
+                                    <p:cond delay="0"/>
+                                  </p:stCondLst>
+                                  <p:childTnLst>
+                                    <p:set>
+                                      <p:cBhvr>
+                                        <p:cTn id="10" dur="1" fill="hold">
+                                          <p:stCondLst>
+                                            <p:cond delay="0"/>
+                                          </p:stCondLst>
+                                        </p:cTn>
+                                        <p:tgtEl>
+                                          <p:spTgt spid="6"/>
+                                        </p:tgtEl>
+                                        <p:attrNameLst>
+                                          <p:attrName>style.visibility</p:attrName>
+                                        </p:attrNameLst>
+                                      </p:cBhvr>
+                                      <p:to>
+                                        <p:strVal val="visible"/>
+                                      </p:to>
+                                    </p:set>
+                                  </p:childTnLst>
+                                </p:cTn>
+                              </p:par>
+                            </p:childTnLst>
+                          </p:cTn>
+                        </p:par>
+                      </p:childTnLst>
+                    </p:cTn>
+                  </p:par>
+                  <p:par>
+                    <p:cTn id="11" fill="hold">
+                      <p:stCondLst>
+                        <p:cond delay="indefinite"/>
+                      </p:stCondLst>
+                      <p:childTnLst>
+                        <p:par>
+                          <p:cTn id="12" fill="hold">
+                            <p:stCondLst>
+                              <p:cond delay="0"/>
+                            </p:stCondLst>
+                            <p:childTnLst>
+                              <p:par>
+                                <p:cTn id="13" presetID="1" presetClass="entr" presetSubtype="0" fill="hold" grpId="0" nodeType="clickEffect">
+                                  <p:stCondLst>
+                                    <p:cond delay="0"/>
+                                  </p:stCondLst>
+                                  <p:childTnLst>
+                                    <p:set>
+                                      <p:cBhvr>
+                                        <p:cTn id="14" dur="1" fill="hold">
+                                          <p:stCondLst>
+                                            <p:cond delay="0"/>
+                                          </p:stCondLst>
+                                        </p:cTn>
+                                        <p:tgtEl>
+                                          <p:spTgt spid="3">
+                                            <p:txEl>
+                                              <p:pRg st="0" end="0"/>
+                                            </p:txEl>
+                                          </p:spTgt>
+                                        </p:tgtEl>
+                                        <p:attrNameLst>
+                                          <p:attrName>style.visibility</p:attrName>
+                                        </p:attrNameLst>
+                                      </p:cBhvr>
+                                      <p:to>
+                                        <p:strVal val="visible"/>
+                                      </p:to>
+                                    </p:set>
+                                  </p:childTnLst>
+                                </p:cTn>
+                              </p:par>
+                            </p:childTnLst>
+                          </p:cTn>
+                        </p:par>
+                      </p:childTnLst>
+                    </p:cTn>
+                  </p:par>
+                  <p:par>
+                    <p:cTn id="15" fill="hold">
+                      <p:stCondLst>
+                        <p:cond delay="indefinite"/>
+                      </p:stCondLst>
+                      <p:childTnLst>
+                        <p:par>
+                          <p:cTn id="16" fill="hold">
+                            <p:stCondLst>
+                              <p:cond delay="0"/>
+                            </p:stCondLst>
+                            <p:childTnLst>
+                              <p:par>
+                                <p:cTn id="17" presetID="1" presetClass="entr" presetSubtype="0" fill="hold" grpId="0" nodeType="clickEffect">
+                                  <p:stCondLst>
+                                    <p:cond delay="0"/>
+                                  </p:stCondLst>
+                                  <p:childTnLst>
+                                    <p:set>
+                                      <p:cBhvr>
+                                        <p:cTn id="18" dur="1" fill="hold">
+                                          <p:stCondLst>
+                                            <p:cond delay="0"/>
+                                          </p:stCondLst>
+                                        </p:cTn>
+                                        <p:tgtEl>
+                                          <p:spTgt spid="3">
+                                            <p:txEl>
+                                              <p:pRg st="5" end="5"/>
+                                            </p:txEl>
+                                          </p:spTgt>
+                                        </p:tgtEl>
+                                        <p:attrNameLst>
+                                          <p:attrName>style.visibility</p:attrName>
+                                        </p:attrNameLst>
+                                      </p:cBhvr>
+                                      <p:to>
+                                        <p:strVal val="visible"/>
+                                      </p:to>
+                                    </p:set>
+                                  </p:childTnLst>
+                                </p:cTn>
+                              </p:par>
+                            </p:childTnLst>
+                          </p:cTn>
+                        </p:par>
+                      </p:childTnLst>
+                    </p:cTn>
+                  </p:par>
+                </p:childTnLst>
+              </p:cTn>
+              <p:prevCondLst>
+                <p:cond evt="onPrev" delay="0">
+                  <p:tgtEl>
+                    <p:sldTgt/>
+                  </p:tgtEl>
+                </p:cond>
+              </p:prevCondLst>
+              <p:nextCondLst>
+                <p:cond evt="onNext" delay="0">
+                  <p:tgtEl>
+                    <p:sldTgt/>
+                  </p:tgtEl>
+                </p:cond>
+              </p:nextCondLst>
+            </p:seq>
+          </p:childTnLst>
+        </p:cTn>
+      </p:par>
+    </p:tnLst>
+    <p:bldLst>
+      <p:bldP spid="3" grpId="0" uiExpand="1" build="p"/>
+      <p:bldP spid="5" grpId="0" animBg="1"/>
+      <p:bldP spid="6" grpId="0" animBg="1"/>
+    </p:bldLst>
+  </p:timing>
+</p:sld>
+</file>
+
+<file path=ppt/slides/slide9.xml><?xml version="1.0" encoding="utf-8"?>
+<p:sld xmlns:a="http://schemas.openxmlformats.org/drawingml/2006/main" xmlns:r="http://schemas.openxmlformats.org/officeDocument/2006/relationships" xmlns:p="http://schemas.openxmlformats.org/presentationml/2006/main">
+  <p:cSld>
+    <p:spTree>
+      <p:nvGrpSpPr>
+        <p:cNvPr id="1" name=""/>
+        <p:cNvGrpSpPr/>
+        <p:nvPr/>
+      </p:nvGrpSpPr>
+      <p:grpSpPr>
+        <a:xfrm>
+          <a:off x="0" y="0"/>
+          <a:ext cx="0" cy="0"/>
+          <a:chOff x="0" y="0"/>
+          <a:chExt cx="0" cy="0"/>
+        </a:xfrm>
+      </p:grpSpPr>
+      <p:sp>
+        <p:nvSpPr>
+          <p:cNvPr id="2" name="Title 1"/>
+          <p:cNvSpPr>
+            <a:spLocks noGrp="1"/>
+          </p:cNvSpPr>
+          <p:nvPr>
+            <p:ph type="title"/>
+          </p:nvPr>
+        </p:nvSpPr>
+        <p:spPr/>
+        <p:txBody>
+          <a:bodyPr/>
+          <a:lstStyle/>
+          <a:p>
+            <a:r>
+              <a:rPr lang="en-US" dirty="0" smtClean="0"/>
+              <a:t>String streams</a:t>
+            </a:r>
+            <a:endParaRPr lang="en-US" dirty="0"/>
+          </a:p>
+        </p:txBody>
+      </p:sp>
+      <p:sp>
+        <p:nvSpPr>
+          <p:cNvPr id="3" name="Content Placeholder 2"/>
+          <p:cNvSpPr>
+            <a:spLocks noGrp="1"/>
+          </p:cNvSpPr>
+          <p:nvPr>
+            <p:ph idx="1"/>
+          </p:nvPr>
+        </p:nvSpPr>
+        <p:spPr/>
+        <p:txBody>
+          <a:bodyPr/>
+          <a:lstStyle/>
+          <a:p>
+            <a:endParaRPr lang="en-US"/>
+          </a:p>
+        </p:txBody>
+      </p:sp>
+      <p:sp>
+        <p:nvSpPr>
+          <p:cNvPr id="4" name="Slide Number Placeholder 3"/>
+          <p:cNvSpPr>
+            <a:spLocks noGrp="1"/>
+          </p:cNvSpPr>
+          <p:nvPr>
+            <p:ph type="sldNum" sz="quarter" idx="12"/>
+          </p:nvPr>
+        </p:nvSpPr>
+        <p:spPr/>
+        <p:txBody>
+          <a:bodyPr/>
+          <a:lstStyle/>
+          <a:p>
+            <a:fld id="{9CEF4966-5219-4577-B301-14467D565841}" type="slidenum">
+              <a:rPr lang="en-US" smtClean="0"/>
+              <a:t>9</a:t>
+            </a:fld>
+            <a:endParaRPr lang="en-US"/>
+          </a:p>
+        </p:txBody>
+      </p:sp>
+    </p:spTree>
+    <p:extLst>
+      <p:ext uri="{BB962C8B-B14F-4D97-AF65-F5344CB8AC3E}">
+        <p14:creationId xmlns:p14="http://schemas.microsoft.com/office/powerpoint/2010/main" val="63569478"/>
+      </p:ext>
+    </p:extLst>
+  </p:cSld>
+  <p:clrMapOvr>
+    <a:masterClrMapping/>
+  </p:clrMapOvr>
+</p:sld>
+</file>
+
 <file path=ppt/theme/theme1.xml><?xml version="1.0" encoding="utf-8"?>
 <a:theme xmlns:a="http://schemas.openxmlformats.org/drawingml/2006/main" name="Office Theme">
   <a:themeElements>

</xml_diff>

<commit_message>
Added slide on string streams
</commit_message>
<xml_diff>
--- a/CPlusPlus/08_essential_cpp_io.pptx
+++ b/CPlusPlus/08_essential_cpp_io.pptx
@@ -8547,7 +8547,28 @@
           <a:bodyPr/>
           <a:lstStyle/>
           <a:p>
-            <a:endParaRPr lang="en-US"/>
+            <a:r>
+              <a:rPr lang="en-US" dirty="0" smtClean="0"/>
+              <a:t>Reading from/writing to </a:t>
+            </a:r>
+            <a:r>
+              <a:rPr lang="en-US" dirty="0" err="1" smtClean="0">
+                <a:latin typeface="Courier New" panose="02070309020205020404" pitchFamily="49" charset="0"/>
+                <a:cs typeface="Courier New" panose="02070309020205020404" pitchFamily="49" charset="0"/>
+              </a:rPr>
+              <a:t>std</a:t>
+            </a:r>
+            <a:r>
+              <a:rPr lang="en-US" dirty="0" smtClean="0">
+                <a:latin typeface="Courier New" panose="02070309020205020404" pitchFamily="49" charset="0"/>
+                <a:cs typeface="Courier New" panose="02070309020205020404" pitchFamily="49" charset="0"/>
+              </a:rPr>
+              <a:t>::string</a:t>
+            </a:r>
+            <a:endParaRPr lang="en-US" dirty="0">
+              <a:latin typeface="Courier New" panose="02070309020205020404" pitchFamily="49" charset="0"/>
+              <a:cs typeface="Courier New" panose="02070309020205020404" pitchFamily="49" charset="0"/>
+            </a:endParaRPr>
           </a:p>
         </p:txBody>
       </p:sp>
@@ -8571,6 +8592,241 @@
               <a:t>9</a:t>
             </a:fld>
             <a:endParaRPr lang="en-US"/>
+          </a:p>
+        </p:txBody>
+      </p:sp>
+      <p:sp>
+        <p:nvSpPr>
+          <p:cNvPr id="5" name="TextBox 4"/>
+          <p:cNvSpPr txBox="1"/>
+          <p:nvPr/>
+        </p:nvSpPr>
+        <p:spPr>
+          <a:xfrm>
+            <a:off x="923618" y="2439544"/>
+            <a:ext cx="4670937" cy="3785652"/>
+          </a:xfrm>
+          <a:prstGeom prst="rect">
+            <a:avLst/>
+          </a:prstGeom>
+          <a:solidFill>
+            <a:schemeClr val="bg1">
+              <a:lumMod val="75000"/>
+            </a:schemeClr>
+          </a:solidFill>
+        </p:spPr>
+        <p:txBody>
+          <a:bodyPr wrap="square" rtlCol="0">
+            <a:spAutoFit/>
+          </a:bodyPr>
+          <a:lstStyle/>
+          <a:p>
+            <a:r>
+              <a:rPr lang="nn-NO" sz="1600" dirty="0" smtClean="0">
+                <a:latin typeface="Courier New" pitchFamily="49" charset="0"/>
+                <a:cs typeface="Courier New" pitchFamily="49" charset="0"/>
+              </a:rPr>
+              <a:t>#include &lt;sstream&gt;</a:t>
+            </a:r>
+          </a:p>
+          <a:p>
+            <a:r>
+              <a:rPr lang="nn-NO" sz="1600" dirty="0" smtClean="0">
+                <a:latin typeface="Courier New" pitchFamily="49" charset="0"/>
+                <a:cs typeface="Courier New" pitchFamily="49" charset="0"/>
+              </a:rPr>
+              <a:t>#include &lt;vector&gt;</a:t>
+            </a:r>
+            <a:endParaRPr lang="nn-NO" sz="1600" dirty="0" smtClean="0">
+              <a:latin typeface="Courier New" pitchFamily="49" charset="0"/>
+              <a:cs typeface="Courier New" pitchFamily="49" charset="0"/>
+            </a:endParaRPr>
+          </a:p>
+          <a:p>
+            <a:r>
+              <a:rPr lang="en-US" sz="1600" dirty="0" smtClean="0">
+                <a:latin typeface="Courier New" panose="02070309020205020404" pitchFamily="49" charset="0"/>
+                <a:cs typeface="Courier New" panose="02070309020205020404" pitchFamily="49" charset="0"/>
+              </a:rPr>
+              <a:t>…</a:t>
+            </a:r>
+          </a:p>
+          <a:p>
+            <a:r>
+              <a:rPr lang="en-US" sz="1600" dirty="0" smtClean="0">
+                <a:latin typeface="Courier New" panose="02070309020205020404" pitchFamily="49" charset="0"/>
+                <a:cs typeface="Courier New" panose="02070309020205020404" pitchFamily="49" charset="0"/>
+              </a:rPr>
+              <a:t>vector&lt;double&gt; data;</a:t>
+            </a:r>
+            <a:endParaRPr lang="nn-NO" sz="1600" dirty="0">
+              <a:latin typeface="Courier New" pitchFamily="49" charset="0"/>
+              <a:cs typeface="Courier New" pitchFamily="49" charset="0"/>
+            </a:endParaRPr>
+          </a:p>
+          <a:p>
+            <a:r>
+              <a:rPr lang="nn-NO" sz="1600" dirty="0" smtClean="0">
+                <a:latin typeface="Courier New" pitchFamily="49" charset="0"/>
+                <a:cs typeface="Courier New" pitchFamily="49" charset="0"/>
+              </a:rPr>
+              <a:t>string line;</a:t>
+            </a:r>
+          </a:p>
+          <a:p>
+            <a:r>
+              <a:rPr lang="nn-NO" sz="1600" dirty="0" smtClean="0">
+                <a:latin typeface="Courier New" pitchFamily="49" charset="0"/>
+                <a:cs typeface="Courier New" pitchFamily="49" charset="0"/>
+              </a:rPr>
+              <a:t>getline(cin, line);</a:t>
+            </a:r>
+          </a:p>
+          <a:p>
+            <a:r>
+              <a:rPr lang="nn-NO" sz="1600" dirty="0" smtClean="0">
+                <a:latin typeface="Courier New" pitchFamily="49" charset="0"/>
+                <a:cs typeface="Courier New" pitchFamily="49" charset="0"/>
+              </a:rPr>
+              <a:t>stringstream </a:t>
+            </a:r>
+            <a:r>
+              <a:rPr lang="nn-NO" sz="1600" dirty="0">
+                <a:latin typeface="Courier New" pitchFamily="49" charset="0"/>
+                <a:cs typeface="Courier New" pitchFamily="49" charset="0"/>
+              </a:rPr>
+              <a:t>str(line);</a:t>
+            </a:r>
+          </a:p>
+          <a:p>
+            <a:r>
+              <a:rPr lang="nn-NO" sz="1600" dirty="0" smtClean="0">
+                <a:latin typeface="Courier New" pitchFamily="49" charset="0"/>
+                <a:cs typeface="Courier New" pitchFamily="49" charset="0"/>
+              </a:rPr>
+              <a:t>double item {0.0</a:t>
+            </a:r>
+            <a:r>
+              <a:rPr lang="nn-NO" sz="1600" dirty="0">
+                <a:latin typeface="Courier New" pitchFamily="49" charset="0"/>
+                <a:cs typeface="Courier New" pitchFamily="49" charset="0"/>
+              </a:rPr>
+              <a:t>};</a:t>
+            </a:r>
+          </a:p>
+          <a:p>
+            <a:r>
+              <a:rPr lang="nn-NO" sz="1600" dirty="0" smtClean="0">
+                <a:latin typeface="Courier New" pitchFamily="49" charset="0"/>
+                <a:cs typeface="Courier New" pitchFamily="49" charset="0"/>
+              </a:rPr>
+              <a:t>str &gt;&gt; item;</a:t>
+            </a:r>
+            <a:endParaRPr lang="nn-NO" sz="1600" dirty="0">
+              <a:latin typeface="Courier New" pitchFamily="49" charset="0"/>
+              <a:cs typeface="Courier New" pitchFamily="49" charset="0"/>
+            </a:endParaRPr>
+          </a:p>
+          <a:p>
+            <a:r>
+              <a:rPr lang="nn-NO" sz="1600" dirty="0" smtClean="0">
+                <a:latin typeface="Courier New" pitchFamily="49" charset="0"/>
+                <a:cs typeface="Courier New" pitchFamily="49" charset="0"/>
+              </a:rPr>
+              <a:t>data.push_back(item);</a:t>
+            </a:r>
+            <a:endParaRPr lang="nn-NO" sz="1600" dirty="0">
+              <a:latin typeface="Courier New" pitchFamily="49" charset="0"/>
+              <a:cs typeface="Courier New" pitchFamily="49" charset="0"/>
+            </a:endParaRPr>
+          </a:p>
+          <a:p>
+            <a:r>
+              <a:rPr lang="nn-NO" sz="1600" dirty="0" smtClean="0">
+                <a:latin typeface="Courier New" pitchFamily="49" charset="0"/>
+                <a:cs typeface="Courier New" pitchFamily="49" charset="0"/>
+              </a:rPr>
+              <a:t>char </a:t>
+            </a:r>
+            <a:r>
+              <a:rPr lang="nn-NO" sz="1600" dirty="0">
+                <a:latin typeface="Courier New" pitchFamily="49" charset="0"/>
+                <a:cs typeface="Courier New" pitchFamily="49" charset="0"/>
+              </a:rPr>
+              <a:t>sep;</a:t>
+            </a:r>
+          </a:p>
+          <a:p>
+            <a:r>
+              <a:rPr lang="nn-NO" sz="1600" dirty="0" smtClean="0">
+                <a:latin typeface="Courier New" pitchFamily="49" charset="0"/>
+                <a:cs typeface="Courier New" pitchFamily="49" charset="0"/>
+              </a:rPr>
+              <a:t>while </a:t>
+            </a:r>
+            <a:r>
+              <a:rPr lang="nn-NO" sz="1600" dirty="0">
+                <a:latin typeface="Courier New" pitchFamily="49" charset="0"/>
+                <a:cs typeface="Courier New" pitchFamily="49" charset="0"/>
+              </a:rPr>
+              <a:t>((sep = str.get()) != -1) {</a:t>
+            </a:r>
+          </a:p>
+          <a:p>
+            <a:r>
+              <a:rPr lang="nn-NO" sz="1600" dirty="0" smtClean="0">
+                <a:latin typeface="Courier New" pitchFamily="49" charset="0"/>
+                <a:cs typeface="Courier New" pitchFamily="49" charset="0"/>
+              </a:rPr>
+              <a:t>    </a:t>
+            </a:r>
+            <a:r>
+              <a:rPr lang="nn-NO" sz="1600" dirty="0">
+                <a:latin typeface="Courier New" pitchFamily="49" charset="0"/>
+                <a:cs typeface="Courier New" pitchFamily="49" charset="0"/>
+              </a:rPr>
+              <a:t>str &gt;&gt; </a:t>
+            </a:r>
+            <a:r>
+              <a:rPr lang="nn-NO" sz="1600" dirty="0" smtClean="0">
+                <a:latin typeface="Courier New" pitchFamily="49" charset="0"/>
+                <a:cs typeface="Courier New" pitchFamily="49" charset="0"/>
+              </a:rPr>
+              <a:t>item;</a:t>
+            </a:r>
+          </a:p>
+          <a:p>
+            <a:r>
+              <a:rPr lang="nn-NO" sz="1600" dirty="0">
+                <a:latin typeface="Courier New" pitchFamily="49" charset="0"/>
+                <a:cs typeface="Courier New" pitchFamily="49" charset="0"/>
+              </a:rPr>
+              <a:t> </a:t>
+            </a:r>
+            <a:r>
+              <a:rPr lang="nn-NO" sz="1600" dirty="0" smtClean="0">
+                <a:latin typeface="Courier New" pitchFamily="49" charset="0"/>
+                <a:cs typeface="Courier New" pitchFamily="49" charset="0"/>
+              </a:rPr>
+              <a:t>   data.push_back(item);</a:t>
+            </a:r>
+            <a:endParaRPr lang="nn-NO" sz="1600" dirty="0">
+              <a:latin typeface="Courier New" pitchFamily="49" charset="0"/>
+              <a:cs typeface="Courier New" pitchFamily="49" charset="0"/>
+            </a:endParaRPr>
+          </a:p>
+          <a:p>
+            <a:r>
+              <a:rPr lang="nn-NO" sz="1600" dirty="0" smtClean="0">
+                <a:latin typeface="Courier New" pitchFamily="49" charset="0"/>
+                <a:cs typeface="Courier New" pitchFamily="49" charset="0"/>
+              </a:rPr>
+              <a:t>}</a:t>
+            </a:r>
+            <a:endParaRPr lang="nn-NO" sz="1600" dirty="0">
+              <a:latin typeface="Courier New" pitchFamily="49" charset="0"/>
+              <a:cs typeface="Courier New" pitchFamily="49" charset="0"/>
+            </a:endParaRPr>
           </a:p>
         </p:txBody>
       </p:sp>
@@ -8584,6 +8840,87 @@
   <p:clrMapOvr>
     <a:masterClrMapping/>
   </p:clrMapOvr>
+  <p:timing>
+    <p:tnLst>
+      <p:par>
+        <p:cTn id="1" dur="indefinite" restart="never" nodeType="tmRoot">
+          <p:childTnLst>
+            <p:seq concurrent="1" nextAc="seek">
+              <p:cTn id="2" dur="indefinite" nodeType="mainSeq">
+                <p:childTnLst>
+                  <p:par>
+                    <p:cTn id="3" fill="hold">
+                      <p:stCondLst>
+                        <p:cond delay="indefinite"/>
+                        <p:cond evt="onBegin" delay="0">
+                          <p:tn val="2"/>
+                        </p:cond>
+                      </p:stCondLst>
+                      <p:childTnLst>
+                        <p:par>
+                          <p:cTn id="4" fill="hold">
+                            <p:stCondLst>
+                              <p:cond delay="0"/>
+                            </p:stCondLst>
+                            <p:childTnLst>
+                              <p:par>
+                                <p:cTn id="5" presetID="1" presetClass="entr" presetSubtype="0" fill="hold" grpId="0" nodeType="withEffect">
+                                  <p:stCondLst>
+                                    <p:cond delay="0"/>
+                                  </p:stCondLst>
+                                  <p:childTnLst>
+                                    <p:set>
+                                      <p:cBhvr>
+                                        <p:cTn id="6" dur="1" fill="hold">
+                                          <p:stCondLst>
+                                            <p:cond delay="0"/>
+                                          </p:stCondLst>
+                                        </p:cTn>
+                                        <p:tgtEl>
+                                          <p:spTgt spid="5"/>
+                                        </p:tgtEl>
+                                        <p:attrNameLst>
+                                          <p:attrName>style.visibility</p:attrName>
+                                        </p:attrNameLst>
+                                      </p:cBhvr>
+                                      <p:to>
+                                        <p:strVal val="visible"/>
+                                      </p:to>
+                                    </p:set>
+                                  </p:childTnLst>
+                                </p:cTn>
+                              </p:par>
+                            </p:childTnLst>
+                          </p:cTn>
+                        </p:par>
+                      </p:childTnLst>
+                    </p:cTn>
+                  </p:par>
+                </p:childTnLst>
+              </p:cTn>
+              <p:prevCondLst>
+                <p:cond evt="onPrev" delay="0">
+                  <p:tgtEl>
+                    <p:sldTgt/>
+                  </p:tgtEl>
+                </p:cond>
+              </p:prevCondLst>
+              <p:nextCondLst>
+                <p:cond evt="onNext" delay="0">
+                  <p:tgtEl>
+                    <p:sldTgt/>
+                  </p:tgtEl>
+                </p:cond>
+              </p:nextCondLst>
+            </p:seq>
+          </p:childTnLst>
+        </p:cTn>
+      </p:par>
+    </p:tnLst>
+    <p:bldLst>
+      <p:bldP spid="5" grpId="0" animBg="1"/>
+    </p:bldLst>
+  </p:timing>
 </p:sld>
 </file>
 

</xml_diff>